<commit_message>
ml analysis & summary
</commit_message>
<xml_diff>
--- a/KWIK_MLW_2019_SUMMER_SUMMARY.pptx
+++ b/KWIK_MLW_2019_SUMMER_SUMMARY.pptx
@@ -20,7 +20,8 @@
     <p:sldId id="282" r:id="rId14"/>
     <p:sldId id="281" r:id="rId15"/>
     <p:sldId id="283" r:id="rId16"/>
-    <p:sldId id="267" r:id="rId17"/>
+    <p:sldId id="284" r:id="rId17"/>
+    <p:sldId id="267" r:id="rId18"/>
   </p:sldIdLst>
   <p:sldSz cx="9144000" cy="6858000" type="screen4x3"/>
   <p:notesSz cx="6858000" cy="9144000"/>
@@ -121,7 +122,7 @@
   </p:defaultTextStyle>
   <p:extLst>
     <p:ext uri="{EFAFB233-063F-42B5-8137-9DF3F51BA10A}">
-      <p15:sldGuideLst xmlns="" xmlns:p15="http://schemas.microsoft.com/office/powerpoint/2012/main">
+      <p15:sldGuideLst xmlns:p15="http://schemas.microsoft.com/office/powerpoint/2012/main" xmlns="">
         <p15:guide id="1" orient="horz" pos="2160">
           <p15:clr>
             <a:srgbClr val="A4A3A4"/>
@@ -3114,13 +3115,7 @@
               <a:rPr lang="pl-PL" dirty="0" smtClean="0">
                 <a:latin typeface="Bahnschrift Condensed" pitchFamily="34" charset="0"/>
               </a:rPr>
-              <a:t>MLW PROJECT – KWIK </a:t>
-            </a:r>
-            <a:r>
-              <a:rPr lang="pl-PL" dirty="0" smtClean="0">
-                <a:latin typeface="Bahnschrift Condensed" pitchFamily="34" charset="0"/>
-              </a:rPr>
-              <a:t>2018-2019</a:t>
+              <a:t>MLW PROJECT – KWIK 2018-2019</a:t>
             </a:r>
             <a:endParaRPr lang="pl-PL" dirty="0">
               <a:latin typeface="Bahnschrift Condensed" pitchFamily="34" charset="0"/>
@@ -3170,8 +3165,8 @@
         </p:nvSpPr>
         <p:spPr>
           <a:xfrm>
-            <a:off x="395536" y="5877272"/>
-            <a:ext cx="5472608" cy="646331"/>
+            <a:off x="395536" y="5733256"/>
+            <a:ext cx="5472608" cy="830997"/>
           </a:xfrm>
           <a:prstGeom prst="rect">
             <a:avLst/>
@@ -3185,26 +3180,20 @@
           <a:lstStyle/>
           <a:p>
             <a:r>
-              <a:rPr lang="pl-PL" dirty="0" smtClean="0">
+              <a:rPr lang="pl-PL" sz="2400" dirty="0" smtClean="0">
                 <a:latin typeface="Bahnschrift Condensed" pitchFamily="34" charset="0"/>
               </a:rPr>
-              <a:t>PAWEŁ </a:t>
-            </a:r>
-            <a:r>
-              <a:rPr lang="pl-PL" dirty="0" smtClean="0">
+              <a:t>PAWEŁ CIŚLIK</a:t>
+            </a:r>
+          </a:p>
+          <a:p>
+            <a:r>
+              <a:rPr lang="pl-PL" sz="2400" dirty="0" smtClean="0">
                 <a:latin typeface="Bahnschrift Condensed" pitchFamily="34" charset="0"/>
               </a:rPr>
-              <a:t>CIŚLIK</a:t>
-            </a:r>
-          </a:p>
-          <a:p>
-            <a:r>
-              <a:rPr lang="pl-PL" dirty="0" smtClean="0">
-                <a:latin typeface="Bahnschrift Condensed" pitchFamily="34" charset="0"/>
-              </a:rPr>
               <a:t>DOMINIKA DRĄŻYK </a:t>
             </a:r>
-            <a:endParaRPr lang="pl-PL" dirty="0">
+            <a:endParaRPr lang="pl-PL" sz="2400" dirty="0">
               <a:latin typeface="Bahnschrift Condensed" pitchFamily="34" charset="0"/>
             </a:endParaRPr>
           </a:p>
@@ -3906,13 +3895,7 @@
               <a:rPr lang="pl-PL" sz="1600" dirty="0" smtClean="0">
                 <a:latin typeface="Bahnschrift Light" pitchFamily="34" charset="0"/>
               </a:rPr>
-              <a:t> </a:t>
-            </a:r>
-            <a:r>
-              <a:rPr lang="pl-PL" sz="1600" dirty="0" smtClean="0">
-                <a:latin typeface="Bahnschrift Light" pitchFamily="34" charset="0"/>
-              </a:rPr>
-              <a:t>for </a:t>
+              <a:t> for </a:t>
             </a:r>
             <a:r>
               <a:rPr lang="pl-PL" sz="1600" dirty="0" err="1" smtClean="0">
@@ -4312,13 +4295,7 @@
               <a:rPr lang="pl-PL" sz="1600" dirty="0" smtClean="0">
                 <a:latin typeface="Bahnschrift Light" pitchFamily="34" charset="0"/>
               </a:rPr>
-              <a:t> </a:t>
-            </a:r>
-            <a:r>
-              <a:rPr lang="pl-PL" sz="1600" dirty="0" smtClean="0">
-                <a:latin typeface="Bahnschrift Light" pitchFamily="34" charset="0"/>
-              </a:rPr>
-              <a:t>	by </a:t>
+              <a:t> 	by </a:t>
             </a:r>
             <a:r>
               <a:rPr lang="pl-PL" sz="1600" b="1" dirty="0" err="1" smtClean="0">
@@ -4671,9 +4648,6 @@
               </a:rPr>
               <a:t>data import </a:t>
             </a:r>
-            <a:endParaRPr lang="pl-PL" sz="2400" dirty="0" smtClean="0">
-              <a:latin typeface="Bahnschrift Light" pitchFamily="34" charset="0"/>
-            </a:endParaRPr>
           </a:p>
           <a:p>
             <a:pPr>
@@ -4738,9 +4712,6 @@
               </a:rPr>
               <a:t>)</a:t>
             </a:r>
-            <a:endParaRPr lang="pl-PL" sz="2400" b="1" dirty="0" smtClean="0">
-              <a:latin typeface="Bahnschrift Light" pitchFamily="34" charset="0"/>
-            </a:endParaRPr>
           </a:p>
           <a:p>
             <a:pPr>
@@ -4793,9 +4764,6 @@
               </a:rPr>
               <a:t> data</a:t>
             </a:r>
-            <a:endParaRPr lang="pl-PL" sz="2400" dirty="0" smtClean="0">
-              <a:latin typeface="Bahnschrift Light" pitchFamily="34" charset="0"/>
-            </a:endParaRPr>
           </a:p>
           <a:p>
             <a:pPr>
@@ -4910,9 +4878,6 @@
               </a:rPr>
               <a:t>)</a:t>
             </a:r>
-            <a:endParaRPr lang="pl-PL" sz="2400" dirty="0" smtClean="0">
-              <a:latin typeface="Bahnschrift Light" pitchFamily="34" charset="0"/>
-            </a:endParaRPr>
           </a:p>
           <a:p>
             <a:pPr>
@@ -4965,9 +4930,6 @@
               </a:rPr>
               <a:t>)</a:t>
             </a:r>
-            <a:endParaRPr lang="pl-PL" sz="2400" dirty="0" smtClean="0">
-              <a:latin typeface="Bahnschrift Light" pitchFamily="34" charset="0"/>
-            </a:endParaRPr>
           </a:p>
         </p:txBody>
       </p:sp>
@@ -5147,9 +5109,6 @@
               </a:rPr>
               <a:t>data import </a:t>
             </a:r>
-            <a:endParaRPr lang="pl-PL" sz="2400" dirty="0" smtClean="0">
-              <a:latin typeface="Bahnschrift Light" pitchFamily="34" charset="0"/>
-            </a:endParaRPr>
           </a:p>
           <a:p>
             <a:pPr>
@@ -5251,9 +5210,6 @@
               </a:rPr>
               <a:t> data</a:t>
             </a:r>
-            <a:endParaRPr lang="pl-PL" sz="2400" dirty="0" smtClean="0">
-              <a:latin typeface="Bahnschrift Light" pitchFamily="34" charset="0"/>
-            </a:endParaRPr>
           </a:p>
           <a:p>
             <a:pPr>
@@ -5368,9 +5324,6 @@
               </a:rPr>
               <a:t>)</a:t>
             </a:r>
-            <a:endParaRPr lang="pl-PL" sz="2400" dirty="0" smtClean="0">
-              <a:latin typeface="Bahnschrift Light" pitchFamily="34" charset="0"/>
-            </a:endParaRPr>
           </a:p>
           <a:p>
             <a:pPr>
@@ -5423,9 +5376,6 @@
               </a:rPr>
               <a:t>)</a:t>
             </a:r>
-            <a:endParaRPr lang="pl-PL" sz="2400" dirty="0" smtClean="0">
-              <a:latin typeface="Bahnschrift Light" pitchFamily="34" charset="0"/>
-            </a:endParaRPr>
           </a:p>
         </p:txBody>
       </p:sp>
@@ -5793,13 +5743,7 @@
               <a:rPr lang="pl-PL" sz="2400" dirty="0" err="1" smtClean="0">
                 <a:latin typeface="Bahnschrift Light" pitchFamily="34" charset="0"/>
               </a:rPr>
-              <a:t>b</a:t>
-            </a:r>
-            <a:r>
-              <a:rPr lang="pl-PL" sz="2400" dirty="0" err="1" smtClean="0">
-                <a:latin typeface="Bahnschrift Light" pitchFamily="34" charset="0"/>
-              </a:rPr>
-              <a:t>io-data</a:t>
+              <a:t>bio-data</a:t>
             </a:r>
             <a:r>
               <a:rPr lang="pl-PL" sz="2400" dirty="0" smtClean="0">
@@ -5845,17 +5789,8 @@
               <a:rPr lang="pl-PL" sz="1600" dirty="0" smtClean="0">
                 <a:latin typeface="Bahnschrift Light" pitchFamily="34" charset="0"/>
               </a:rPr>
-              <a:t> </a:t>
-            </a:r>
-            <a:r>
-              <a:rPr lang="pl-PL" sz="1600" dirty="0" smtClean="0">
-                <a:latin typeface="Bahnschrift Light" pitchFamily="34" charset="0"/>
-              </a:rPr>
-              <a:t>to do </a:t>
-            </a:r>
-            <a:endParaRPr lang="pl-PL" sz="1600" dirty="0" smtClean="0">
-              <a:latin typeface="Bahnschrift Light" pitchFamily="34" charset="0"/>
-            </a:endParaRPr>
+              <a:t> to do </a:t>
+            </a:r>
           </a:p>
           <a:p>
             <a:pPr lvl="1">
@@ -5979,17 +5914,8 @@
               <a:rPr lang="pl-PL" sz="1600" dirty="0" smtClean="0">
                 <a:latin typeface="Bahnschrift Light" pitchFamily="34" charset="0"/>
               </a:rPr>
-              <a:t> </a:t>
-            </a:r>
-            <a:r>
-              <a:rPr lang="pl-PL" sz="1600" dirty="0" smtClean="0">
-                <a:latin typeface="Bahnschrift Light" pitchFamily="34" charset="0"/>
-              </a:rPr>
-              <a:t> high … </a:t>
-            </a:r>
-            <a:endParaRPr lang="pl-PL" sz="1600" dirty="0" smtClean="0">
-              <a:latin typeface="Bahnschrift Light" pitchFamily="34" charset="0"/>
-            </a:endParaRPr>
+              <a:t>  high … </a:t>
+            </a:r>
           </a:p>
           <a:p>
             <a:pPr lvl="1">
@@ -6210,13 +6136,7 @@
               <a:rPr lang="pl-PL" sz="1600" dirty="0" err="1" smtClean="0">
                 <a:latin typeface="Bahnschrift Light" pitchFamily="34" charset="0"/>
               </a:rPr>
-              <a:t>t</a:t>
-            </a:r>
-            <a:r>
-              <a:rPr lang="pl-PL" sz="1600" dirty="0" err="1" smtClean="0">
-                <a:latin typeface="Bahnschrift Light" pitchFamily="34" charset="0"/>
-              </a:rPr>
-              <a:t>hen</a:t>
+              <a:t>then</a:t>
             </a:r>
             <a:r>
               <a:rPr lang="pl-PL" sz="1600" dirty="0" smtClean="0">
@@ -6284,9 +6204,6 @@
               </a:rPr>
               <a:t> on   </a:t>
             </a:r>
-            <a:endParaRPr lang="pl-PL" sz="1600" dirty="0" smtClean="0">
-              <a:latin typeface="Bahnschrift Light" pitchFamily="34" charset="0"/>
-            </a:endParaRPr>
           </a:p>
           <a:p>
             <a:pPr>
@@ -6493,13 +6410,7 @@
               <a:rPr lang="pl-PL" sz="1600" dirty="0" err="1" smtClean="0">
                 <a:latin typeface="Bahnschrift Light" pitchFamily="34" charset="0"/>
               </a:rPr>
-              <a:t>d</a:t>
-            </a:r>
-            <a:r>
-              <a:rPr lang="pl-PL" sz="1600" dirty="0" err="1" smtClean="0">
-                <a:latin typeface="Bahnschrift Light" pitchFamily="34" charset="0"/>
-              </a:rPr>
-              <a:t>oes</a:t>
+              <a:t>does</a:t>
             </a:r>
             <a:r>
               <a:rPr lang="pl-PL" sz="1600" dirty="0" smtClean="0">
@@ -6530,13 +6441,7 @@
               <a:rPr lang="pl-PL" sz="1600" dirty="0" err="1" smtClean="0">
                 <a:latin typeface="Bahnschrift Light" pitchFamily="34" charset="0"/>
               </a:rPr>
-              <a:t>h</a:t>
-            </a:r>
-            <a:r>
-              <a:rPr lang="pl-PL" sz="1600" dirty="0" err="1" smtClean="0">
-                <a:latin typeface="Bahnschrift Light" pitchFamily="34" charset="0"/>
-              </a:rPr>
-              <a:t>as</a:t>
+              <a:t>has</a:t>
             </a:r>
             <a:r>
               <a:rPr lang="pl-PL" sz="1600" dirty="0" smtClean="0">
@@ -6579,13 +6484,7 @@
               <a:rPr lang="pl-PL" sz="1600" dirty="0" err="1" smtClean="0">
                 <a:latin typeface="Bahnschrift Light" pitchFamily="34" charset="0"/>
               </a:rPr>
-              <a:t>y</a:t>
-            </a:r>
-            <a:r>
-              <a:rPr lang="pl-PL" sz="1600" dirty="0" err="1" smtClean="0">
-                <a:latin typeface="Bahnschrift Light" pitchFamily="34" charset="0"/>
-              </a:rPr>
-              <a:t>ou</a:t>
+              <a:t>you</a:t>
             </a:r>
             <a:r>
               <a:rPr lang="pl-PL" sz="1600" dirty="0" smtClean="0">
@@ -6651,13 +6550,7 @@
               <a:rPr lang="pl-PL" sz="2400" dirty="0" smtClean="0">
                 <a:latin typeface="Bahnschrift Light" pitchFamily="34" charset="0"/>
               </a:rPr>
-              <a:t>  Environment /</a:t>
-            </a:r>
-            <a:r>
-              <a:rPr lang="pl-PL" sz="2400" dirty="0" smtClean="0">
-                <a:latin typeface="Bahnschrift Light" pitchFamily="34" charset="0"/>
-              </a:rPr>
-              <a:t> Jupiter Notebook (</a:t>
+              <a:t>  Environment / Jupiter Notebook (</a:t>
             </a:r>
             <a:r>
               <a:rPr lang="pl-PL" sz="2400" dirty="0" err="1" smtClean="0">
@@ -6671,9 +6564,6 @@
               </a:rPr>
               <a:t>, R)</a:t>
             </a:r>
-            <a:endParaRPr lang="pl-PL" sz="2400" dirty="0" smtClean="0">
-              <a:latin typeface="Bahnschrift Light" pitchFamily="34" charset="0"/>
-            </a:endParaRPr>
           </a:p>
           <a:p>
             <a:pPr lvl="1">
@@ -6729,9 +6619,6 @@
               </a:rPr>
               <a:t> </a:t>
             </a:r>
-            <a:endParaRPr lang="pl-PL" sz="1600" dirty="0" smtClean="0">
-              <a:latin typeface="Bahnschrift Light" pitchFamily="34" charset="0"/>
-            </a:endParaRPr>
           </a:p>
           <a:p>
             <a:pPr lvl="1">
@@ -6743,13 +6630,7 @@
               <a:rPr lang="pl-PL" sz="1600" dirty="0" err="1" smtClean="0">
                 <a:latin typeface="Bahnschrift Light" pitchFamily="34" charset="0"/>
               </a:rPr>
-              <a:t>y</a:t>
-            </a:r>
-            <a:r>
-              <a:rPr lang="pl-PL" sz="1600" dirty="0" err="1" smtClean="0">
-                <a:latin typeface="Bahnschrift Light" pitchFamily="34" charset="0"/>
-              </a:rPr>
-              <a:t>ou</a:t>
+              <a:t>you</a:t>
             </a:r>
             <a:r>
               <a:rPr lang="pl-PL" sz="1600" dirty="0" smtClean="0">
@@ -6869,9 +6750,6 @@
               </a:rPr>
               <a:t> </a:t>
             </a:r>
-            <a:endParaRPr lang="pl-PL" sz="1600" dirty="0" smtClean="0">
-              <a:latin typeface="Bahnschrift Light" pitchFamily="34" charset="0"/>
-            </a:endParaRPr>
           </a:p>
           <a:p>
             <a:pPr lvl="1">
@@ -6961,13 +6839,7 @@
               <a:rPr lang="pl-PL" sz="1600" dirty="0" err="1" smtClean="0">
                 <a:latin typeface="Bahnschrift Light" pitchFamily="34" charset="0"/>
               </a:rPr>
-              <a:t>a</a:t>
-            </a:r>
-            <a:r>
-              <a:rPr lang="pl-PL" sz="1600" dirty="0" err="1" smtClean="0">
-                <a:latin typeface="Bahnschrift Light" pitchFamily="34" charset="0"/>
-              </a:rPr>
-              <a:t>fter</a:t>
+              <a:t>after</a:t>
             </a:r>
             <a:r>
               <a:rPr lang="pl-PL" sz="1600" dirty="0" smtClean="0">
@@ -7045,13 +6917,7 @@
               <a:rPr lang="pl-PL" sz="1600" dirty="0" smtClean="0">
                 <a:latin typeface="Bahnschrift Light" pitchFamily="34" charset="0"/>
               </a:rPr>
-              <a:t> </a:t>
-            </a:r>
-            <a:r>
-              <a:rPr lang="pl-PL" sz="1600" dirty="0" smtClean="0">
-                <a:latin typeface="Bahnschrift Light" pitchFamily="34" charset="0"/>
-              </a:rPr>
-              <a:t>and Matlab </a:t>
+              <a:t> and Matlab </a:t>
             </a:r>
             <a:r>
               <a:rPr lang="pl-PL" sz="1600" dirty="0" err="1" smtClean="0">
@@ -7101,9 +6967,6 @@
               </a:rPr>
               <a:t> …</a:t>
             </a:r>
-            <a:endParaRPr lang="pl-PL" sz="1600" dirty="0" smtClean="0">
-              <a:latin typeface="Bahnschrift Light" pitchFamily="34" charset="0"/>
-            </a:endParaRPr>
           </a:p>
         </p:txBody>
       </p:sp>
@@ -7116,6 +6979,1390 @@
 </file>
 
 <file path=ppt/slides/slide16.xml><?xml version="1.0" encoding="utf-8"?>
+<p:sld xmlns:a="http://schemas.openxmlformats.org/drawingml/2006/main" xmlns:r="http://schemas.openxmlformats.org/officeDocument/2006/relationships" xmlns:p="http://schemas.openxmlformats.org/presentationml/2006/main">
+  <p:cSld>
+    <p:spTree>
+      <p:nvGrpSpPr>
+        <p:cNvPr id="1" name=""/>
+        <p:cNvGrpSpPr/>
+        <p:nvPr/>
+      </p:nvGrpSpPr>
+      <p:grpSpPr>
+        <a:xfrm>
+          <a:off x="0" y="0"/>
+          <a:ext cx="0" cy="0"/>
+          <a:chOff x="0" y="0"/>
+          <a:chExt cx="0" cy="0"/>
+        </a:xfrm>
+      </p:grpSpPr>
+      <p:sp>
+        <p:nvSpPr>
+          <p:cNvPr id="2" name="Tytuł 1"/>
+          <p:cNvSpPr>
+            <a:spLocks noGrp="1"/>
+          </p:cNvSpPr>
+          <p:nvPr>
+            <p:ph type="title"/>
+          </p:nvPr>
+        </p:nvSpPr>
+        <p:spPr>
+          <a:xfrm>
+            <a:off x="251520" y="188640"/>
+            <a:ext cx="8640960" cy="648072"/>
+          </a:xfrm>
+        </p:spPr>
+        <p:txBody>
+          <a:bodyPr>
+            <a:noAutofit/>
+          </a:bodyPr>
+          <a:lstStyle/>
+          <a:p>
+            <a:pPr algn="l"/>
+            <a:r>
+              <a:rPr lang="pl-PL" sz="3200" dirty="0" smtClean="0">
+                <a:latin typeface="Bahnschrift Condensed" pitchFamily="34" charset="0"/>
+              </a:rPr>
+              <a:t>WHAT WE'VE BEEN DOING THE WHOLE TIME … </a:t>
+            </a:r>
+            <a:endParaRPr lang="pl-PL" sz="3200" dirty="0">
+              <a:latin typeface="Bahnschrift Condensed" pitchFamily="34" charset="0"/>
+            </a:endParaRPr>
+          </a:p>
+        </p:txBody>
+      </p:sp>
+      <p:sp>
+        <p:nvSpPr>
+          <p:cNvPr id="3" name="Symbol zastępczy zawartości 2"/>
+          <p:cNvSpPr>
+            <a:spLocks noGrp="1"/>
+          </p:cNvSpPr>
+          <p:nvPr>
+            <p:ph idx="1"/>
+          </p:nvPr>
+        </p:nvSpPr>
+        <p:spPr>
+          <a:xfrm>
+            <a:off x="395536" y="980728"/>
+            <a:ext cx="8229600" cy="6093296"/>
+          </a:xfrm>
+        </p:spPr>
+        <p:txBody>
+          <a:bodyPr>
+            <a:normAutofit lnSpcReduction="10000"/>
+          </a:bodyPr>
+          <a:lstStyle/>
+          <a:p>
+            <a:pPr>
+              <a:buBlip>
+                <a:blip r:embed="rId2"/>
+              </a:buBlip>
+            </a:pPr>
+            <a:r>
+              <a:rPr lang="pl-PL" sz="1800" dirty="0" smtClean="0">
+                <a:latin typeface="Bahnschrift Light" pitchFamily="34" charset="0"/>
+              </a:rPr>
+              <a:t>We </a:t>
+            </a:r>
+            <a:r>
+              <a:rPr lang="pl-PL" sz="1800" dirty="0" err="1" smtClean="0">
+                <a:latin typeface="Bahnschrift Light" pitchFamily="34" charset="0"/>
+              </a:rPr>
+              <a:t>have</a:t>
+            </a:r>
+            <a:r>
+              <a:rPr lang="pl-PL" sz="1800" dirty="0" smtClean="0">
+                <a:latin typeface="Bahnschrift Light" pitchFamily="34" charset="0"/>
+              </a:rPr>
+              <a:t> </a:t>
+            </a:r>
+            <a:r>
+              <a:rPr lang="pl-PL" sz="1800" dirty="0" err="1" smtClean="0">
+                <a:latin typeface="Bahnschrift Light" pitchFamily="34" charset="0"/>
+              </a:rPr>
+              <a:t>been</a:t>
+            </a:r>
+            <a:r>
+              <a:rPr lang="pl-PL" sz="1800" dirty="0" smtClean="0">
+                <a:latin typeface="Bahnschrift Light" pitchFamily="34" charset="0"/>
+              </a:rPr>
+              <a:t> </a:t>
+            </a:r>
+            <a:r>
+              <a:rPr lang="pl-PL" sz="1800" b="1" dirty="0" err="1" smtClean="0">
+                <a:latin typeface="Bahnschrift Light" pitchFamily="34" charset="0"/>
+              </a:rPr>
+              <a:t>participating</a:t>
+            </a:r>
+            <a:r>
+              <a:rPr lang="pl-PL" sz="1800" b="1" dirty="0" smtClean="0">
+                <a:latin typeface="Bahnschrift Light" pitchFamily="34" charset="0"/>
+              </a:rPr>
+              <a:t> </a:t>
+            </a:r>
+            <a:r>
+              <a:rPr lang="pl-PL" sz="1800" b="1" dirty="0" err="1" smtClean="0">
+                <a:latin typeface="Bahnschrift Light" pitchFamily="34" charset="0"/>
+              </a:rPr>
+              <a:t>in</a:t>
+            </a:r>
+            <a:r>
+              <a:rPr lang="pl-PL" sz="1800" b="1" dirty="0" smtClean="0">
+                <a:latin typeface="Bahnschrift Light" pitchFamily="34" charset="0"/>
+              </a:rPr>
+              <a:t> </a:t>
+            </a:r>
+            <a:r>
+              <a:rPr lang="pl-PL" sz="1800" b="1" dirty="0" err="1" smtClean="0">
+                <a:latin typeface="Bahnschrift Light" pitchFamily="34" charset="0"/>
+              </a:rPr>
+              <a:t>several</a:t>
+            </a:r>
+            <a:r>
+              <a:rPr lang="pl-PL" sz="1800" b="1" dirty="0" smtClean="0">
+                <a:latin typeface="Bahnschrift Light" pitchFamily="34" charset="0"/>
+              </a:rPr>
+              <a:t> </a:t>
+            </a:r>
+            <a:r>
+              <a:rPr lang="pl-PL" sz="1800" b="1" dirty="0" err="1" smtClean="0">
+                <a:latin typeface="Bahnschrift Light" pitchFamily="34" charset="0"/>
+              </a:rPr>
+              <a:t>projects</a:t>
+            </a:r>
+            <a:r>
+              <a:rPr lang="pl-PL" sz="1800" b="1" dirty="0" smtClean="0">
+                <a:latin typeface="Bahnschrift Light" pitchFamily="34" charset="0"/>
+              </a:rPr>
+              <a:t> as </a:t>
+            </a:r>
+            <a:r>
+              <a:rPr lang="pl-PL" sz="1800" b="1" dirty="0" err="1" smtClean="0">
+                <a:latin typeface="Bahnschrift Light" pitchFamily="34" charset="0"/>
+              </a:rPr>
+              <a:t>interns</a:t>
+            </a:r>
+            <a:r>
+              <a:rPr lang="pl-PL" sz="1800" dirty="0" smtClean="0">
+                <a:latin typeface="Bahnschrift Light" pitchFamily="34" charset="0"/>
+              </a:rPr>
+              <a:t> </a:t>
+            </a:r>
+          </a:p>
+          <a:p>
+            <a:pPr>
+              <a:buNone/>
+            </a:pPr>
+            <a:r>
+              <a:rPr lang="pl-PL" sz="1400" dirty="0" smtClean="0">
+                <a:latin typeface="Bahnschrift Light" pitchFamily="34" charset="0"/>
+              </a:rPr>
+              <a:t>	</a:t>
+            </a:r>
+            <a:r>
+              <a:rPr lang="pl-PL" sz="1400" dirty="0" err="1" smtClean="0">
+                <a:latin typeface="Bahnschrift Light" pitchFamily="34" charset="0"/>
+              </a:rPr>
+              <a:t>the</a:t>
+            </a:r>
+            <a:r>
+              <a:rPr lang="pl-PL" sz="1400" dirty="0" smtClean="0">
+                <a:latin typeface="Bahnschrift Light" pitchFamily="34" charset="0"/>
+              </a:rPr>
+              <a:t> </a:t>
+            </a:r>
+            <a:r>
+              <a:rPr lang="pl-PL" sz="1400" dirty="0" err="1" smtClean="0">
+                <a:latin typeface="Bahnschrift Light" pitchFamily="34" charset="0"/>
+              </a:rPr>
+              <a:t>results</a:t>
+            </a:r>
+            <a:r>
+              <a:rPr lang="pl-PL" sz="1400" dirty="0" smtClean="0">
+                <a:latin typeface="Bahnschrift Light" pitchFamily="34" charset="0"/>
+              </a:rPr>
+              <a:t> </a:t>
+            </a:r>
+            <a:r>
+              <a:rPr lang="pl-PL" sz="1400" dirty="0" err="1" smtClean="0">
+                <a:latin typeface="Bahnschrift Light" pitchFamily="34" charset="0"/>
+              </a:rPr>
+              <a:t>are</a:t>
+            </a:r>
+            <a:r>
+              <a:rPr lang="pl-PL" sz="1400" dirty="0" smtClean="0">
+                <a:latin typeface="Bahnschrift Light" pitchFamily="34" charset="0"/>
+              </a:rPr>
+              <a:t> </a:t>
+            </a:r>
+            <a:r>
+              <a:rPr lang="pl-PL" sz="1400" dirty="0" err="1" smtClean="0">
+                <a:latin typeface="Bahnschrift Light" pitchFamily="34" charset="0"/>
+              </a:rPr>
+              <a:t>the</a:t>
+            </a:r>
+            <a:r>
+              <a:rPr lang="pl-PL" sz="1400" dirty="0" smtClean="0">
+                <a:latin typeface="Bahnschrift Light" pitchFamily="34" charset="0"/>
+              </a:rPr>
+              <a:t> EEG data </a:t>
+            </a:r>
+            <a:r>
+              <a:rPr lang="pl-PL" sz="1400" dirty="0" err="1" smtClean="0">
+                <a:latin typeface="Bahnschrift Light" pitchFamily="34" charset="0"/>
+              </a:rPr>
+              <a:t>analysis</a:t>
+            </a:r>
+            <a:r>
+              <a:rPr lang="pl-PL" sz="1400" dirty="0" smtClean="0">
+                <a:latin typeface="Bahnschrift Light" pitchFamily="34" charset="0"/>
+              </a:rPr>
+              <a:t> </a:t>
+            </a:r>
+            <a:r>
+              <a:rPr lang="pl-PL" sz="1400" dirty="0" err="1" smtClean="0">
+                <a:latin typeface="Bahnschrift Light" pitchFamily="34" charset="0"/>
+              </a:rPr>
+              <a:t>qpproaches</a:t>
+            </a:r>
+            <a:r>
+              <a:rPr lang="pl-PL" sz="1400" dirty="0" smtClean="0">
+                <a:latin typeface="Bahnschrift Light" pitchFamily="34" charset="0"/>
+              </a:rPr>
+              <a:t> </a:t>
+            </a:r>
+          </a:p>
+          <a:p>
+            <a:pPr>
+              <a:buNone/>
+            </a:pPr>
+            <a:endParaRPr lang="pl-PL" sz="1400" dirty="0" smtClean="0">
+              <a:latin typeface="Bahnschrift Light" pitchFamily="34" charset="0"/>
+            </a:endParaRPr>
+          </a:p>
+          <a:p>
+            <a:pPr>
+              <a:buBlip>
+                <a:blip r:embed="rId2"/>
+              </a:buBlip>
+            </a:pPr>
+            <a:r>
+              <a:rPr lang="pl-PL" sz="1800" dirty="0" smtClean="0">
+                <a:latin typeface="Bahnschrift Light" pitchFamily="34" charset="0"/>
+              </a:rPr>
+              <a:t>We </a:t>
+            </a:r>
+            <a:r>
+              <a:rPr lang="pl-PL" sz="1800" dirty="0" err="1" smtClean="0">
+                <a:latin typeface="Bahnschrift Light" pitchFamily="34" charset="0"/>
+              </a:rPr>
+              <a:t>have</a:t>
+            </a:r>
+            <a:r>
+              <a:rPr lang="pl-PL" sz="1800" dirty="0" smtClean="0">
+                <a:latin typeface="Bahnschrift Light" pitchFamily="34" charset="0"/>
+              </a:rPr>
+              <a:t> </a:t>
+            </a:r>
+            <a:r>
+              <a:rPr lang="pl-PL" sz="1800" dirty="0" err="1" smtClean="0">
+                <a:latin typeface="Bahnschrift Light" pitchFamily="34" charset="0"/>
+              </a:rPr>
+              <a:t>been</a:t>
+            </a:r>
+            <a:r>
+              <a:rPr lang="pl-PL" sz="1800" dirty="0" smtClean="0">
+                <a:latin typeface="Bahnschrift Light" pitchFamily="34" charset="0"/>
+              </a:rPr>
+              <a:t> </a:t>
+            </a:r>
+            <a:r>
+              <a:rPr lang="pl-PL" sz="1800" dirty="0" smtClean="0">
+                <a:latin typeface="Bahnschrift Light" pitchFamily="34" charset="0"/>
+              </a:rPr>
+              <a:t> </a:t>
+            </a:r>
+            <a:r>
+              <a:rPr lang="pl-PL" sz="1800" b="1" dirty="0" err="1" smtClean="0">
+                <a:latin typeface="Bahnschrift Light" pitchFamily="34" charset="0"/>
+              </a:rPr>
+              <a:t>doing</a:t>
+            </a:r>
+            <a:r>
+              <a:rPr lang="pl-PL" sz="1800" b="1" dirty="0" smtClean="0">
+                <a:latin typeface="Bahnschrift Light" pitchFamily="34" charset="0"/>
+              </a:rPr>
+              <a:t> </a:t>
+            </a:r>
+            <a:r>
+              <a:rPr lang="pl-PL" sz="1800" b="1" dirty="0" err="1" smtClean="0">
+                <a:latin typeface="Bahnschrift Light" pitchFamily="34" charset="0"/>
+              </a:rPr>
+              <a:t>our</a:t>
+            </a:r>
+            <a:r>
+              <a:rPr lang="pl-PL" sz="1800" b="1" dirty="0" smtClean="0">
+                <a:latin typeface="Bahnschrift Light" pitchFamily="34" charset="0"/>
+              </a:rPr>
+              <a:t> </a:t>
+            </a:r>
+            <a:r>
+              <a:rPr lang="pl-PL" sz="1800" b="1" dirty="0" err="1" smtClean="0">
+                <a:latin typeface="Bahnschrift Light" pitchFamily="34" charset="0"/>
+              </a:rPr>
+              <a:t>own</a:t>
+            </a:r>
+            <a:r>
+              <a:rPr lang="pl-PL" sz="1800" b="1" dirty="0" smtClean="0">
+                <a:latin typeface="Bahnschrift Light" pitchFamily="34" charset="0"/>
+              </a:rPr>
+              <a:t> data </a:t>
+            </a:r>
+            <a:r>
+              <a:rPr lang="pl-PL" sz="1800" b="1" dirty="0" err="1" smtClean="0">
+                <a:latin typeface="Bahnschrift Light" pitchFamily="34" charset="0"/>
+              </a:rPr>
+              <a:t>analysis</a:t>
+            </a:r>
+            <a:endParaRPr lang="pl-PL" sz="1800" b="1" dirty="0" smtClean="0">
+              <a:latin typeface="Bahnschrift Light" pitchFamily="34" charset="0"/>
+            </a:endParaRPr>
+          </a:p>
+          <a:p>
+            <a:pPr>
+              <a:buNone/>
+            </a:pPr>
+            <a:r>
+              <a:rPr lang="pl-PL" sz="1400" dirty="0" smtClean="0">
+                <a:latin typeface="Bahnschrift Light" pitchFamily="34" charset="0"/>
+              </a:rPr>
+              <a:t>	</a:t>
+            </a:r>
+            <a:r>
+              <a:rPr lang="pl-PL" sz="1400" dirty="0" err="1" smtClean="0">
+                <a:latin typeface="Bahnschrift Light" pitchFamily="34" charset="0"/>
+              </a:rPr>
+              <a:t>the</a:t>
+            </a:r>
+            <a:r>
+              <a:rPr lang="pl-PL" sz="1400" dirty="0" smtClean="0">
+                <a:latin typeface="Bahnschrift Light" pitchFamily="34" charset="0"/>
+              </a:rPr>
+              <a:t> </a:t>
+            </a:r>
+            <a:r>
+              <a:rPr lang="pl-PL" sz="1400" dirty="0" err="1" smtClean="0">
+                <a:latin typeface="Bahnschrift Light" pitchFamily="34" charset="0"/>
+              </a:rPr>
+              <a:t>results</a:t>
+            </a:r>
+            <a:r>
+              <a:rPr lang="pl-PL" sz="1400" dirty="0" smtClean="0">
+                <a:latin typeface="Bahnschrift Light" pitchFamily="34" charset="0"/>
+              </a:rPr>
+              <a:t> </a:t>
+            </a:r>
+            <a:r>
+              <a:rPr lang="pl-PL" sz="1400" dirty="0" err="1" smtClean="0">
+                <a:latin typeface="Bahnschrift Light" pitchFamily="34" charset="0"/>
+              </a:rPr>
+              <a:t>are</a:t>
+            </a:r>
+            <a:r>
+              <a:rPr lang="pl-PL" sz="1400" dirty="0" smtClean="0">
+                <a:latin typeface="Bahnschrift Light" pitchFamily="34" charset="0"/>
+              </a:rPr>
+              <a:t> </a:t>
+            </a:r>
+            <a:r>
+              <a:rPr lang="pl-PL" sz="1400" dirty="0" err="1" smtClean="0">
+                <a:latin typeface="Bahnschrift Light" pitchFamily="34" charset="0"/>
+              </a:rPr>
+              <a:t>the</a:t>
+            </a:r>
+            <a:r>
+              <a:rPr lang="pl-PL" sz="1400" dirty="0" smtClean="0">
+                <a:latin typeface="Bahnschrift Light" pitchFamily="34" charset="0"/>
+              </a:rPr>
+              <a:t> </a:t>
+            </a:r>
+            <a:r>
+              <a:rPr lang="pl-PL" sz="1400" dirty="0" err="1" smtClean="0">
+                <a:latin typeface="Bahnschrift Light" pitchFamily="34" charset="0"/>
+              </a:rPr>
+              <a:t>bio-signal</a:t>
+            </a:r>
+            <a:r>
+              <a:rPr lang="pl-PL" sz="1400" dirty="0" smtClean="0">
+                <a:latin typeface="Bahnschrift Light" pitchFamily="34" charset="0"/>
+              </a:rPr>
+              <a:t> data </a:t>
+            </a:r>
+            <a:r>
+              <a:rPr lang="pl-PL" sz="1400" dirty="0" err="1" smtClean="0">
+                <a:latin typeface="Bahnschrift Light" pitchFamily="34" charset="0"/>
+              </a:rPr>
+              <a:t>analysis</a:t>
+            </a:r>
+            <a:r>
+              <a:rPr lang="pl-PL" sz="1400" dirty="0" smtClean="0">
+                <a:latin typeface="Bahnschrift Light" pitchFamily="34" charset="0"/>
+              </a:rPr>
+              <a:t> </a:t>
+            </a:r>
+            <a:r>
+              <a:rPr lang="pl-PL" sz="1400" dirty="0" err="1" smtClean="0">
+                <a:latin typeface="Bahnschrift Light" pitchFamily="34" charset="0"/>
+              </a:rPr>
+              <a:t>approaches</a:t>
+            </a:r>
+            <a:endParaRPr lang="pl-PL" sz="1400" dirty="0" smtClean="0">
+              <a:latin typeface="Bahnschrift Light" pitchFamily="34" charset="0"/>
+            </a:endParaRPr>
+          </a:p>
+          <a:p>
+            <a:pPr>
+              <a:buNone/>
+            </a:pPr>
+            <a:endParaRPr lang="pl-PL" sz="1400" dirty="0" smtClean="0">
+              <a:latin typeface="Bahnschrift Light" pitchFamily="34" charset="0"/>
+            </a:endParaRPr>
+          </a:p>
+          <a:p>
+            <a:pPr>
+              <a:buFont typeface="Arial" pitchFamily="34" charset="0"/>
+              <a:buBlip>
+                <a:blip r:embed="rId2"/>
+              </a:buBlip>
+            </a:pPr>
+            <a:r>
+              <a:rPr lang="pl-PL" sz="1800" dirty="0" smtClean="0">
+                <a:latin typeface="Bahnschrift Light" pitchFamily="34" charset="0"/>
+              </a:rPr>
+              <a:t>We </a:t>
+            </a:r>
+            <a:r>
+              <a:rPr lang="pl-PL" sz="1800" dirty="0" err="1" smtClean="0">
+                <a:latin typeface="Bahnschrift Light" pitchFamily="34" charset="0"/>
+              </a:rPr>
+              <a:t>have</a:t>
+            </a:r>
+            <a:r>
+              <a:rPr lang="pl-PL" sz="1800" dirty="0" smtClean="0">
+                <a:latin typeface="Bahnschrift Light" pitchFamily="34" charset="0"/>
+              </a:rPr>
+              <a:t> </a:t>
+            </a:r>
+            <a:r>
+              <a:rPr lang="pl-PL" sz="1800" dirty="0" err="1" smtClean="0">
+                <a:latin typeface="Bahnschrift Light" pitchFamily="34" charset="0"/>
+              </a:rPr>
+              <a:t>been</a:t>
+            </a:r>
+            <a:r>
+              <a:rPr lang="pl-PL" sz="1800" dirty="0" smtClean="0">
+                <a:latin typeface="Bahnschrift Light" pitchFamily="34" charset="0"/>
+              </a:rPr>
+              <a:t> </a:t>
+            </a:r>
+            <a:r>
+              <a:rPr lang="pl-PL" sz="1800" b="1" dirty="0" err="1" smtClean="0">
+                <a:latin typeface="Bahnschrift Light" pitchFamily="34" charset="0"/>
+              </a:rPr>
+              <a:t>participating</a:t>
+            </a:r>
+            <a:r>
+              <a:rPr lang="pl-PL" sz="1800" b="1" dirty="0" smtClean="0">
+                <a:latin typeface="Bahnschrift Light" pitchFamily="34" charset="0"/>
+              </a:rPr>
+              <a:t> </a:t>
+            </a:r>
+            <a:r>
+              <a:rPr lang="pl-PL" sz="1800" b="1" dirty="0" err="1" smtClean="0">
+                <a:latin typeface="Bahnschrift Light" pitchFamily="34" charset="0"/>
+              </a:rPr>
+              <a:t>in</a:t>
+            </a:r>
+            <a:r>
+              <a:rPr lang="pl-PL" sz="1800" b="1" dirty="0" smtClean="0">
+                <a:latin typeface="Bahnschrift Light" pitchFamily="34" charset="0"/>
+              </a:rPr>
+              <a:t> </a:t>
+            </a:r>
+            <a:r>
+              <a:rPr lang="pl-PL" sz="1800" b="1" dirty="0" err="1" smtClean="0">
+                <a:latin typeface="Bahnschrift Light" pitchFamily="34" charset="0"/>
+              </a:rPr>
+              <a:t>some</a:t>
+            </a:r>
+            <a:r>
+              <a:rPr lang="pl-PL" sz="1800" b="1" dirty="0" smtClean="0">
+                <a:latin typeface="Bahnschrift Light" pitchFamily="34" charset="0"/>
+              </a:rPr>
+              <a:t> </a:t>
+            </a:r>
+            <a:r>
+              <a:rPr lang="pl-PL" sz="1800" b="1" dirty="0" err="1" smtClean="0">
+                <a:latin typeface="Bahnschrift Light" pitchFamily="34" charset="0"/>
+              </a:rPr>
+              <a:t>workshops</a:t>
+            </a:r>
+            <a:endParaRPr lang="pl-PL" sz="1800" b="1" dirty="0" smtClean="0">
+              <a:latin typeface="Bahnschrift Light" pitchFamily="34" charset="0"/>
+            </a:endParaRPr>
+          </a:p>
+          <a:p>
+            <a:pPr>
+              <a:buFont typeface="Arial" pitchFamily="34" charset="0"/>
+              <a:buNone/>
+            </a:pPr>
+            <a:r>
+              <a:rPr lang="pl-PL" sz="1800" dirty="0" smtClean="0">
+                <a:latin typeface="Bahnschrift Light" pitchFamily="34" charset="0"/>
+              </a:rPr>
+              <a:t>	</a:t>
+            </a:r>
+            <a:r>
+              <a:rPr lang="pl-PL" sz="1400" dirty="0" err="1" smtClean="0">
+                <a:latin typeface="Bahnschrift Light" pitchFamily="34" charset="0"/>
+              </a:rPr>
+              <a:t>the</a:t>
+            </a:r>
+            <a:r>
+              <a:rPr lang="pl-PL" sz="1400" dirty="0" smtClean="0">
+                <a:latin typeface="Bahnschrift Light" pitchFamily="34" charset="0"/>
+              </a:rPr>
+              <a:t> </a:t>
+            </a:r>
+            <a:r>
+              <a:rPr lang="pl-PL" sz="1400" dirty="0" err="1" smtClean="0">
+                <a:latin typeface="Bahnschrift Light" pitchFamily="34" charset="0"/>
+              </a:rPr>
+              <a:t>results</a:t>
+            </a:r>
+            <a:r>
+              <a:rPr lang="pl-PL" sz="1400" dirty="0" smtClean="0">
+                <a:latin typeface="Bahnschrift Light" pitchFamily="34" charset="0"/>
+              </a:rPr>
+              <a:t> </a:t>
+            </a:r>
+            <a:r>
+              <a:rPr lang="pl-PL" sz="1400" dirty="0" err="1" smtClean="0">
+                <a:latin typeface="Bahnschrift Light" pitchFamily="34" charset="0"/>
+              </a:rPr>
+              <a:t>are</a:t>
+            </a:r>
+            <a:r>
+              <a:rPr lang="pl-PL" sz="1400" dirty="0" smtClean="0">
+                <a:latin typeface="Bahnschrift Light" pitchFamily="34" charset="0"/>
+              </a:rPr>
+              <a:t> </a:t>
+            </a:r>
+            <a:r>
+              <a:rPr lang="pl-PL" sz="1400" dirty="0" err="1" smtClean="0">
+                <a:latin typeface="Bahnschrift Light" pitchFamily="34" charset="0"/>
+              </a:rPr>
+              <a:t>the</a:t>
+            </a:r>
+            <a:r>
+              <a:rPr lang="pl-PL" sz="1400" dirty="0" smtClean="0">
+                <a:latin typeface="Bahnschrift Light" pitchFamily="34" charset="0"/>
+              </a:rPr>
+              <a:t> </a:t>
+            </a:r>
+            <a:r>
+              <a:rPr lang="pl-PL" sz="1400" dirty="0" err="1" smtClean="0">
+                <a:latin typeface="Bahnschrift Light" pitchFamily="34" charset="0"/>
+              </a:rPr>
+              <a:t>bayes</a:t>
+            </a:r>
+            <a:r>
+              <a:rPr lang="pl-PL" sz="1400" dirty="0" smtClean="0">
+                <a:latin typeface="Bahnschrift Light" pitchFamily="34" charset="0"/>
+              </a:rPr>
+              <a:t> data </a:t>
+            </a:r>
+            <a:r>
+              <a:rPr lang="pl-PL" sz="1400" dirty="0" err="1" smtClean="0">
+                <a:latin typeface="Bahnschrift Light" pitchFamily="34" charset="0"/>
+              </a:rPr>
+              <a:t>analysis</a:t>
+            </a:r>
+            <a:r>
+              <a:rPr lang="pl-PL" sz="1400" dirty="0" smtClean="0">
+                <a:latin typeface="Bahnschrift Light" pitchFamily="34" charset="0"/>
+              </a:rPr>
+              <a:t> </a:t>
+            </a:r>
+            <a:r>
+              <a:rPr lang="pl-PL" sz="1400" dirty="0" err="1" smtClean="0">
+                <a:latin typeface="Bahnschrift Light" pitchFamily="34" charset="0"/>
+              </a:rPr>
+              <a:t>approach</a:t>
+            </a:r>
+            <a:endParaRPr lang="pl-PL" sz="1400" dirty="0" smtClean="0">
+              <a:latin typeface="Bahnschrift Light" pitchFamily="34" charset="0"/>
+            </a:endParaRPr>
+          </a:p>
+          <a:p>
+            <a:pPr>
+              <a:buFont typeface="Arial" pitchFamily="34" charset="0"/>
+              <a:buNone/>
+            </a:pPr>
+            <a:endParaRPr lang="pl-PL" sz="1400" dirty="0" smtClean="0">
+              <a:latin typeface="Bahnschrift Light" pitchFamily="34" charset="0"/>
+            </a:endParaRPr>
+          </a:p>
+          <a:p>
+            <a:pPr>
+              <a:buBlip>
+                <a:blip r:embed="rId2"/>
+              </a:buBlip>
+            </a:pPr>
+            <a:r>
+              <a:rPr lang="pl-PL" sz="1800" dirty="0" smtClean="0">
+                <a:latin typeface="Bahnschrift Light" pitchFamily="34" charset="0"/>
+              </a:rPr>
+              <a:t>We </a:t>
+            </a:r>
+            <a:r>
+              <a:rPr lang="pl-PL" sz="1800" dirty="0" err="1" smtClean="0">
+                <a:latin typeface="Bahnschrift Light" pitchFamily="34" charset="0"/>
+              </a:rPr>
+              <a:t>have</a:t>
+            </a:r>
+            <a:r>
+              <a:rPr lang="pl-PL" sz="1800" dirty="0" smtClean="0">
+                <a:latin typeface="Bahnschrift Light" pitchFamily="34" charset="0"/>
+              </a:rPr>
+              <a:t> </a:t>
+            </a:r>
+            <a:r>
+              <a:rPr lang="pl-PL" sz="1800" dirty="0" err="1" smtClean="0">
+                <a:latin typeface="Bahnschrift Light" pitchFamily="34" charset="0"/>
+              </a:rPr>
+              <a:t>been</a:t>
+            </a:r>
+            <a:r>
+              <a:rPr lang="pl-PL" sz="1800" dirty="0" smtClean="0">
+                <a:latin typeface="Bahnschrift Light" pitchFamily="34" charset="0"/>
+              </a:rPr>
+              <a:t> </a:t>
+            </a:r>
+            <a:r>
+              <a:rPr lang="pl-PL" sz="1800" b="1" dirty="0" err="1" smtClean="0">
+                <a:latin typeface="Bahnschrift Light" pitchFamily="34" charset="0"/>
+              </a:rPr>
+              <a:t>leading</a:t>
+            </a:r>
+            <a:r>
+              <a:rPr lang="pl-PL" sz="1800" b="1" dirty="0" smtClean="0">
+                <a:latin typeface="Bahnschrift Light" pitchFamily="34" charset="0"/>
+              </a:rPr>
+              <a:t> </a:t>
+            </a:r>
+            <a:r>
+              <a:rPr lang="pl-PL" sz="1800" b="1" dirty="0" err="1" smtClean="0">
+                <a:latin typeface="Bahnschrift Light" pitchFamily="34" charset="0"/>
+              </a:rPr>
+              <a:t>some</a:t>
+            </a:r>
+            <a:r>
+              <a:rPr lang="pl-PL" sz="1800" b="1" dirty="0" smtClean="0">
+                <a:latin typeface="Bahnschrift Light" pitchFamily="34" charset="0"/>
+              </a:rPr>
+              <a:t> </a:t>
+            </a:r>
+            <a:r>
+              <a:rPr lang="pl-PL" sz="1800" b="1" dirty="0" err="1" smtClean="0">
+                <a:latin typeface="Bahnschrift Light" pitchFamily="34" charset="0"/>
+              </a:rPr>
+              <a:t>workshops</a:t>
+            </a:r>
+            <a:r>
+              <a:rPr lang="pl-PL" sz="1800" b="1" dirty="0" smtClean="0">
+                <a:latin typeface="Bahnschrift Light" pitchFamily="34" charset="0"/>
+              </a:rPr>
+              <a:t> </a:t>
+            </a:r>
+            <a:r>
+              <a:rPr lang="pl-PL" sz="1800" b="1" dirty="0" err="1" smtClean="0">
+                <a:latin typeface="Bahnschrift Light" pitchFamily="34" charset="0"/>
+              </a:rPr>
+              <a:t>ourselves</a:t>
+            </a:r>
+            <a:endParaRPr lang="pl-PL" sz="1800" b="1" dirty="0" smtClean="0">
+              <a:latin typeface="Bahnschrift Light" pitchFamily="34" charset="0"/>
+            </a:endParaRPr>
+          </a:p>
+          <a:p>
+            <a:pPr>
+              <a:buNone/>
+            </a:pPr>
+            <a:r>
+              <a:rPr lang="pl-PL" sz="1800" dirty="0" smtClean="0">
+                <a:latin typeface="Bahnschrift Light" pitchFamily="34" charset="0"/>
+              </a:rPr>
+              <a:t>	</a:t>
+            </a:r>
+            <a:r>
+              <a:rPr lang="pl-PL" sz="1400" dirty="0" err="1" smtClean="0">
+                <a:latin typeface="Bahnschrift Light" pitchFamily="34" charset="0"/>
+              </a:rPr>
+              <a:t>the</a:t>
+            </a:r>
+            <a:r>
+              <a:rPr lang="pl-PL" sz="1400" dirty="0" smtClean="0">
+                <a:latin typeface="Bahnschrift Light" pitchFamily="34" charset="0"/>
+              </a:rPr>
+              <a:t> </a:t>
+            </a:r>
+            <a:r>
+              <a:rPr lang="pl-PL" sz="1400" dirty="0" err="1" smtClean="0">
+                <a:latin typeface="Bahnschrift Light" pitchFamily="34" charset="0"/>
+              </a:rPr>
+              <a:t>results</a:t>
+            </a:r>
+            <a:r>
+              <a:rPr lang="pl-PL" sz="1400" dirty="0" smtClean="0">
+                <a:latin typeface="Bahnschrift Light" pitchFamily="34" charset="0"/>
+              </a:rPr>
+              <a:t> </a:t>
+            </a:r>
+            <a:r>
+              <a:rPr lang="pl-PL" sz="1400" dirty="0" err="1" smtClean="0">
+                <a:latin typeface="Bahnschrift Light" pitchFamily="34" charset="0"/>
+              </a:rPr>
+              <a:t>are</a:t>
+            </a:r>
+            <a:r>
+              <a:rPr lang="pl-PL" sz="1400" dirty="0" smtClean="0">
+                <a:latin typeface="Bahnschrift Light" pitchFamily="34" charset="0"/>
+              </a:rPr>
+              <a:t> </a:t>
+            </a:r>
+            <a:r>
+              <a:rPr lang="pl-PL" sz="1400" dirty="0" err="1" smtClean="0">
+                <a:latin typeface="Bahnschrift Light" pitchFamily="34" charset="0"/>
+              </a:rPr>
+              <a:t>the</a:t>
+            </a:r>
+            <a:r>
+              <a:rPr lang="pl-PL" sz="1400" dirty="0" smtClean="0">
+                <a:latin typeface="Bahnschrift Light" pitchFamily="34" charset="0"/>
+              </a:rPr>
+              <a:t> </a:t>
+            </a:r>
+            <a:r>
+              <a:rPr lang="pl-PL" sz="1400" dirty="0" err="1" smtClean="0">
+                <a:latin typeface="Bahnschrift Light" pitchFamily="34" charset="0"/>
+              </a:rPr>
+              <a:t>behavioural</a:t>
+            </a:r>
+            <a:r>
+              <a:rPr lang="pl-PL" sz="1400" dirty="0" smtClean="0">
+                <a:latin typeface="Bahnschrift Light" pitchFamily="34" charset="0"/>
+              </a:rPr>
+              <a:t> data </a:t>
+            </a:r>
+            <a:r>
+              <a:rPr lang="pl-PL" sz="1400" dirty="0" err="1" smtClean="0">
+                <a:latin typeface="Bahnschrift Light" pitchFamily="34" charset="0"/>
+              </a:rPr>
+              <a:t>analysis</a:t>
+            </a:r>
+            <a:r>
+              <a:rPr lang="pl-PL" sz="1400" dirty="0" smtClean="0">
+                <a:latin typeface="Bahnschrift Light" pitchFamily="34" charset="0"/>
+              </a:rPr>
+              <a:t> </a:t>
+            </a:r>
+            <a:r>
+              <a:rPr lang="pl-PL" sz="1400" dirty="0" err="1" smtClean="0">
+                <a:latin typeface="Bahnschrift Light" pitchFamily="34" charset="0"/>
+              </a:rPr>
+              <a:t>approach</a:t>
+            </a:r>
+            <a:endParaRPr lang="pl-PL" sz="1400" dirty="0" smtClean="0">
+              <a:latin typeface="Bahnschrift Light" pitchFamily="34" charset="0"/>
+            </a:endParaRPr>
+          </a:p>
+          <a:p>
+            <a:pPr>
+              <a:buNone/>
+            </a:pPr>
+            <a:endParaRPr lang="pl-PL" sz="1600" dirty="0" smtClean="0">
+              <a:latin typeface="Bahnschrift Light" pitchFamily="34" charset="0"/>
+            </a:endParaRPr>
+          </a:p>
+          <a:p>
+            <a:pPr>
+              <a:buBlip>
+                <a:blip r:embed="rId2"/>
+              </a:buBlip>
+            </a:pPr>
+            <a:r>
+              <a:rPr lang="pl-PL" sz="2000" dirty="0" smtClean="0">
+                <a:latin typeface="Bahnschrift Light" pitchFamily="34" charset="0"/>
+              </a:rPr>
+              <a:t>We </a:t>
+            </a:r>
+            <a:r>
+              <a:rPr lang="pl-PL" sz="2000" dirty="0" err="1" smtClean="0">
+                <a:latin typeface="Bahnschrift Light" pitchFamily="34" charset="0"/>
+              </a:rPr>
+              <a:t>have</a:t>
+            </a:r>
+            <a:r>
+              <a:rPr lang="pl-PL" sz="2000" dirty="0" smtClean="0">
+                <a:latin typeface="Bahnschrift Light" pitchFamily="34" charset="0"/>
+              </a:rPr>
+              <a:t> </a:t>
+            </a:r>
+            <a:r>
+              <a:rPr lang="pl-PL" sz="2000" dirty="0" err="1" smtClean="0">
+                <a:latin typeface="Bahnschrift Light" pitchFamily="34" charset="0"/>
+              </a:rPr>
+              <a:t>been</a:t>
+            </a:r>
+            <a:r>
+              <a:rPr lang="pl-PL" sz="2000" dirty="0" smtClean="0">
+                <a:latin typeface="Bahnschrift Light" pitchFamily="34" charset="0"/>
+              </a:rPr>
+              <a:t> </a:t>
+            </a:r>
+            <a:r>
+              <a:rPr lang="pl-PL" sz="2000" b="1" dirty="0" err="1" smtClean="0">
+                <a:latin typeface="Bahnschrift Light" pitchFamily="34" charset="0"/>
+              </a:rPr>
+              <a:t>in</a:t>
+            </a:r>
+            <a:r>
+              <a:rPr lang="pl-PL" sz="2000" b="1" dirty="0" smtClean="0">
+                <a:latin typeface="Bahnschrift Light" pitchFamily="34" charset="0"/>
+              </a:rPr>
+              <a:t> KWIK_2018/19 </a:t>
+            </a:r>
+            <a:r>
+              <a:rPr lang="pl-PL" sz="2000" b="1" dirty="0" err="1" smtClean="0">
+                <a:latin typeface="Bahnschrift Light" pitchFamily="34" charset="0"/>
+              </a:rPr>
+              <a:t>course</a:t>
+            </a:r>
+            <a:r>
+              <a:rPr lang="pl-PL" sz="2000" b="1" dirty="0" smtClean="0">
+                <a:latin typeface="Bahnschrift Light" pitchFamily="34" charset="0"/>
+              </a:rPr>
+              <a:t> </a:t>
+            </a:r>
+            <a:endParaRPr lang="pl-PL" sz="2000" b="1" dirty="0" smtClean="0">
+              <a:latin typeface="Bahnschrift Light" pitchFamily="34" charset="0"/>
+            </a:endParaRPr>
+          </a:p>
+          <a:p>
+            <a:pPr lvl="1">
+              <a:lnSpc>
+                <a:spcPct val="160000"/>
+              </a:lnSpc>
+              <a:buBlip>
+                <a:blip r:embed="rId2"/>
+              </a:buBlip>
+            </a:pPr>
+            <a:r>
+              <a:rPr lang="pl-PL" sz="1600" dirty="0" smtClean="0">
+                <a:latin typeface="Bahnschrift Light" pitchFamily="34" charset="0"/>
+              </a:rPr>
+              <a:t>	</a:t>
+            </a:r>
+            <a:r>
+              <a:rPr lang="pl-PL" sz="1600" dirty="0" err="1" smtClean="0">
+                <a:latin typeface="Bahnschrift Light" pitchFamily="34" charset="0"/>
+              </a:rPr>
+              <a:t>the</a:t>
+            </a:r>
+            <a:r>
+              <a:rPr lang="pl-PL" sz="1600" dirty="0" smtClean="0">
+                <a:latin typeface="Bahnschrift Light" pitchFamily="34" charset="0"/>
+              </a:rPr>
+              <a:t> </a:t>
+            </a:r>
+            <a:r>
+              <a:rPr lang="pl-PL" sz="1600" dirty="0" err="1" smtClean="0">
+                <a:latin typeface="Bahnschrift Light" pitchFamily="34" charset="0"/>
+              </a:rPr>
+              <a:t>results</a:t>
+            </a:r>
+            <a:r>
+              <a:rPr lang="pl-PL" sz="1600" dirty="0" smtClean="0">
+                <a:latin typeface="Bahnschrift Light" pitchFamily="34" charset="0"/>
+              </a:rPr>
+              <a:t> </a:t>
+            </a:r>
+            <a:r>
+              <a:rPr lang="pl-PL" sz="1600" dirty="0" err="1" smtClean="0">
+                <a:latin typeface="Bahnschrift Light" pitchFamily="34" charset="0"/>
+              </a:rPr>
+              <a:t>are</a:t>
+            </a:r>
+            <a:r>
+              <a:rPr lang="pl-PL" sz="1600" dirty="0" smtClean="0">
+                <a:latin typeface="Bahnschrift Light" pitchFamily="34" charset="0"/>
+              </a:rPr>
+              <a:t> </a:t>
+            </a:r>
+            <a:r>
+              <a:rPr lang="pl-PL" sz="1600" dirty="0" err="1" smtClean="0">
+                <a:latin typeface="Bahnschrift Light" pitchFamily="34" charset="0"/>
+              </a:rPr>
+              <a:t>the</a:t>
+            </a:r>
+            <a:r>
+              <a:rPr lang="pl-PL" sz="1600" dirty="0" smtClean="0">
+                <a:latin typeface="Bahnschrift Light" pitchFamily="34" charset="0"/>
+              </a:rPr>
+              <a:t> </a:t>
+            </a:r>
+            <a:r>
+              <a:rPr lang="pl-PL" sz="1600" dirty="0" err="1" smtClean="0">
+                <a:latin typeface="Bahnschrift Light" pitchFamily="34" charset="0"/>
+              </a:rPr>
+              <a:t>machine</a:t>
+            </a:r>
+            <a:r>
+              <a:rPr lang="pl-PL" sz="1600" dirty="0" smtClean="0">
+                <a:latin typeface="Bahnschrift Light" pitchFamily="34" charset="0"/>
+              </a:rPr>
+              <a:t> learning data </a:t>
+            </a:r>
+            <a:r>
+              <a:rPr lang="pl-PL" sz="1600" dirty="0" err="1" smtClean="0">
+                <a:latin typeface="Bahnschrift Light" pitchFamily="34" charset="0"/>
+              </a:rPr>
+              <a:t>analysis</a:t>
+            </a:r>
+            <a:r>
+              <a:rPr lang="pl-PL" sz="1600" dirty="0" smtClean="0">
+                <a:latin typeface="Bahnschrift Light" pitchFamily="34" charset="0"/>
+              </a:rPr>
+              <a:t> </a:t>
+            </a:r>
+            <a:r>
+              <a:rPr lang="pl-PL" sz="1600" dirty="0" err="1" smtClean="0">
+                <a:latin typeface="Bahnschrift Light" pitchFamily="34" charset="0"/>
+              </a:rPr>
+              <a:t>approach</a:t>
+            </a:r>
+            <a:r>
+              <a:rPr lang="pl-PL" sz="1600" dirty="0" smtClean="0">
+                <a:latin typeface="Bahnschrift Light" pitchFamily="34" charset="0"/>
+              </a:rPr>
+              <a:t>, </a:t>
+            </a:r>
+            <a:endParaRPr lang="pl-PL" sz="1600" dirty="0" smtClean="0">
+              <a:latin typeface="Bahnschrift Light" pitchFamily="34" charset="0"/>
+            </a:endParaRPr>
+          </a:p>
+          <a:p>
+            <a:pPr lvl="1">
+              <a:lnSpc>
+                <a:spcPct val="160000"/>
+              </a:lnSpc>
+              <a:buBlip>
+                <a:blip r:embed="rId2"/>
+              </a:buBlip>
+            </a:pPr>
+            <a:r>
+              <a:rPr lang="pl-PL" sz="1600" dirty="0" smtClean="0">
+                <a:latin typeface="Bahnschrift Light" pitchFamily="34" charset="0"/>
+              </a:rPr>
+              <a:t>	</a:t>
+            </a:r>
+            <a:r>
+              <a:rPr lang="pl-PL" sz="1600" dirty="0" err="1" smtClean="0">
+                <a:latin typeface="Bahnschrift Light" pitchFamily="34" charset="0"/>
+              </a:rPr>
+              <a:t>familiarization</a:t>
+            </a:r>
+            <a:r>
+              <a:rPr lang="pl-PL" sz="1600" dirty="0" smtClean="0">
+                <a:latin typeface="Bahnschrift Light" pitchFamily="34" charset="0"/>
+              </a:rPr>
+              <a:t> </a:t>
+            </a:r>
+            <a:r>
+              <a:rPr lang="pl-PL" sz="1600" dirty="0" err="1" smtClean="0">
+                <a:latin typeface="Bahnschrift Light" pitchFamily="34" charset="0"/>
+              </a:rPr>
+              <a:t>with</a:t>
+            </a:r>
+            <a:r>
+              <a:rPr lang="pl-PL" sz="1600" dirty="0" smtClean="0">
+                <a:latin typeface="Bahnschrift Light" pitchFamily="34" charset="0"/>
+              </a:rPr>
+              <a:t> </a:t>
+            </a:r>
+            <a:r>
+              <a:rPr lang="pl-PL" sz="1600" dirty="0" err="1" smtClean="0">
+                <a:latin typeface="Bahnschrift Light" pitchFamily="34" charset="0"/>
+              </a:rPr>
+              <a:t>Colaboratory</a:t>
+            </a:r>
+            <a:r>
+              <a:rPr lang="pl-PL" sz="1600" dirty="0" smtClean="0">
+                <a:latin typeface="Bahnschrift Light" pitchFamily="34" charset="0"/>
+              </a:rPr>
+              <a:t>, Jupiter Notebook, </a:t>
+            </a:r>
+            <a:r>
+              <a:rPr lang="pl-PL" sz="1600" dirty="0" err="1" smtClean="0">
+                <a:latin typeface="Bahnschrift Light" pitchFamily="34" charset="0"/>
+              </a:rPr>
+              <a:t>GitHub</a:t>
+            </a:r>
+            <a:r>
+              <a:rPr lang="pl-PL" sz="1600" dirty="0" smtClean="0">
+                <a:latin typeface="Bahnschrift Light" pitchFamily="34" charset="0"/>
+              </a:rPr>
+              <a:t>, </a:t>
+            </a:r>
+            <a:endParaRPr lang="pl-PL" sz="1600" dirty="0" smtClean="0">
+              <a:latin typeface="Bahnschrift Light" pitchFamily="34" charset="0"/>
+            </a:endParaRPr>
+          </a:p>
+          <a:p>
+            <a:pPr lvl="1">
+              <a:lnSpc>
+                <a:spcPct val="160000"/>
+              </a:lnSpc>
+              <a:buBlip>
+                <a:blip r:embed="rId2"/>
+              </a:buBlip>
+            </a:pPr>
+            <a:r>
+              <a:rPr lang="pl-PL" sz="1600" dirty="0" smtClean="0">
+                <a:latin typeface="Bahnschrift Light" pitchFamily="34" charset="0"/>
+              </a:rPr>
+              <a:t>	</a:t>
+            </a:r>
+            <a:r>
+              <a:rPr lang="pl-PL" sz="1600" dirty="0" err="1" smtClean="0">
+                <a:latin typeface="Bahnschrift Light" pitchFamily="34" charset="0"/>
+              </a:rPr>
+              <a:t>our</a:t>
+            </a:r>
+            <a:r>
+              <a:rPr lang="pl-PL" sz="1600" dirty="0" smtClean="0">
+                <a:latin typeface="Bahnschrift Light" pitchFamily="34" charset="0"/>
+              </a:rPr>
+              <a:t> </a:t>
+            </a:r>
+            <a:r>
+              <a:rPr lang="pl-PL" sz="1600" dirty="0" err="1" smtClean="0">
+                <a:latin typeface="Bahnschrift Light" pitchFamily="34" charset="0"/>
+              </a:rPr>
+              <a:t>own</a:t>
+            </a:r>
+            <a:r>
+              <a:rPr lang="pl-PL" sz="1600" dirty="0" smtClean="0">
+                <a:latin typeface="Bahnschrift Light" pitchFamily="34" charset="0"/>
+              </a:rPr>
+              <a:t> </a:t>
+            </a:r>
+            <a:r>
+              <a:rPr lang="pl-PL" sz="1600" dirty="0" err="1" smtClean="0">
+                <a:latin typeface="Bahnschrift Light" pitchFamily="34" charset="0"/>
+              </a:rPr>
+              <a:t>approach</a:t>
+            </a:r>
+            <a:r>
+              <a:rPr lang="pl-PL" sz="1600" dirty="0" smtClean="0">
+                <a:latin typeface="Bahnschrift Light" pitchFamily="34" charset="0"/>
+              </a:rPr>
+              <a:t> to data form ‘</a:t>
+            </a:r>
+            <a:r>
+              <a:rPr lang="pl-PL" sz="1600" dirty="0" err="1" smtClean="0">
+                <a:latin typeface="Bahnschrift Light" pitchFamily="34" charset="0"/>
+              </a:rPr>
+              <a:t>Depresjon</a:t>
+            </a:r>
+            <a:r>
+              <a:rPr lang="pl-PL" sz="1600" dirty="0" smtClean="0">
+                <a:latin typeface="Bahnschrift Light" pitchFamily="34" charset="0"/>
+              </a:rPr>
+              <a:t>’ </a:t>
+            </a:r>
+            <a:r>
+              <a:rPr lang="pl-PL" sz="1600" dirty="0" err="1" smtClean="0">
+                <a:latin typeface="Bahnschrift Light" pitchFamily="34" charset="0"/>
+              </a:rPr>
+              <a:t>project</a:t>
+            </a:r>
+            <a:r>
+              <a:rPr lang="pl-PL" sz="1600" dirty="0" smtClean="0">
+                <a:latin typeface="Bahnschrift Light" pitchFamily="34" charset="0"/>
+              </a:rPr>
+              <a:t>, </a:t>
+            </a:r>
+            <a:endParaRPr lang="pl-PL" sz="1600" dirty="0" smtClean="0">
+              <a:latin typeface="Bahnschrift Light" pitchFamily="34" charset="0"/>
+            </a:endParaRPr>
+          </a:p>
+          <a:p>
+            <a:pPr lvl="1">
+              <a:lnSpc>
+                <a:spcPct val="160000"/>
+              </a:lnSpc>
+              <a:buBlip>
+                <a:blip r:embed="rId2"/>
+              </a:buBlip>
+            </a:pPr>
+            <a:r>
+              <a:rPr lang="pl-PL" sz="1600" dirty="0" smtClean="0">
+                <a:latin typeface="Bahnschrift Light" pitchFamily="34" charset="0"/>
+              </a:rPr>
+              <a:t>	</a:t>
+            </a:r>
+            <a:r>
+              <a:rPr lang="pl-PL" sz="1600" dirty="0" err="1" smtClean="0">
+                <a:latin typeface="Bahnschrift Light" pitchFamily="34" charset="0"/>
+              </a:rPr>
+              <a:t>creating</a:t>
+            </a:r>
+            <a:r>
+              <a:rPr lang="pl-PL" sz="1600" dirty="0" smtClean="0">
+                <a:latin typeface="Bahnschrift Light" pitchFamily="34" charset="0"/>
+              </a:rPr>
+              <a:t> </a:t>
+            </a:r>
+            <a:r>
+              <a:rPr lang="pl-PL" sz="1600" dirty="0" err="1" smtClean="0">
+                <a:latin typeface="Bahnschrift Light" pitchFamily="34" charset="0"/>
+              </a:rPr>
+              <a:t>the</a:t>
+            </a:r>
+            <a:r>
+              <a:rPr lang="pl-PL" sz="1600" dirty="0" smtClean="0">
+                <a:latin typeface="Bahnschrift Light" pitchFamily="34" charset="0"/>
+              </a:rPr>
+              <a:t> </a:t>
+            </a:r>
+            <a:r>
+              <a:rPr lang="pl-PL" sz="1600" dirty="0" err="1" smtClean="0">
+                <a:latin typeface="Bahnschrift Light" pitchFamily="34" charset="0"/>
+              </a:rPr>
+              <a:t>consistent</a:t>
+            </a:r>
+            <a:r>
+              <a:rPr lang="pl-PL" sz="1600" dirty="0" smtClean="0">
+                <a:latin typeface="Bahnschrift Light" pitchFamily="34" charset="0"/>
+              </a:rPr>
+              <a:t> </a:t>
+            </a:r>
+            <a:r>
+              <a:rPr lang="pl-PL" sz="1600" dirty="0" err="1" smtClean="0">
+                <a:latin typeface="Bahnschrift Light" pitchFamily="34" charset="0"/>
+              </a:rPr>
+              <a:t>Repository</a:t>
+            </a:r>
+            <a:r>
+              <a:rPr lang="pl-PL" sz="1600" dirty="0" smtClean="0">
+                <a:latin typeface="Bahnschrift Light" pitchFamily="34" charset="0"/>
+              </a:rPr>
+              <a:t> </a:t>
+            </a:r>
+            <a:r>
+              <a:rPr lang="pl-PL" sz="1600" dirty="0" err="1" smtClean="0">
+                <a:latin typeface="Bahnschrift Light" pitchFamily="34" charset="0"/>
+              </a:rPr>
+              <a:t>from</a:t>
+            </a:r>
+            <a:r>
+              <a:rPr lang="pl-PL" sz="1600" dirty="0" smtClean="0">
+                <a:latin typeface="Bahnschrift Light" pitchFamily="34" charset="0"/>
+              </a:rPr>
+              <a:t> </a:t>
+            </a:r>
+            <a:r>
+              <a:rPr lang="pl-PL" sz="1600" dirty="0" err="1" smtClean="0">
+                <a:latin typeface="Bahnschrift Light" pitchFamily="34" charset="0"/>
+              </a:rPr>
+              <a:t>all</a:t>
+            </a:r>
+            <a:r>
+              <a:rPr lang="pl-PL" sz="1600" dirty="0" smtClean="0">
+                <a:latin typeface="Bahnschrift Light" pitchFamily="34" charset="0"/>
+              </a:rPr>
+              <a:t> </a:t>
+            </a:r>
+            <a:r>
+              <a:rPr lang="pl-PL" sz="1600" dirty="0" err="1" smtClean="0">
+                <a:latin typeface="Bahnschrift Light" pitchFamily="34" charset="0"/>
+              </a:rPr>
+              <a:t>above</a:t>
+            </a:r>
+            <a:r>
+              <a:rPr lang="pl-PL" sz="1600" dirty="0" smtClean="0">
+                <a:latin typeface="Bahnschrift Light" pitchFamily="34" charset="0"/>
+              </a:rPr>
+              <a:t> </a:t>
+            </a:r>
+            <a:r>
+              <a:rPr lang="pl-PL" sz="1600" dirty="0" err="1" smtClean="0">
+                <a:latin typeface="Bahnschrift Light" pitchFamily="34" charset="0"/>
+              </a:rPr>
+              <a:t>with</a:t>
+            </a:r>
+            <a:r>
+              <a:rPr lang="pl-PL" sz="1600" dirty="0" smtClean="0">
+                <a:latin typeface="Bahnschrift Light" pitchFamily="34" charset="0"/>
+              </a:rPr>
+              <a:t> </a:t>
+            </a:r>
+            <a:r>
+              <a:rPr lang="pl-PL" sz="1600" dirty="0" err="1" smtClean="0">
+                <a:latin typeface="Bahnschrift Light" pitchFamily="34" charset="0"/>
+              </a:rPr>
+              <a:t>useful</a:t>
+            </a:r>
+            <a:r>
+              <a:rPr lang="pl-PL" sz="1600" dirty="0" smtClean="0">
+                <a:latin typeface="Bahnschrift Light" pitchFamily="34" charset="0"/>
+              </a:rPr>
+              <a:t> </a:t>
+            </a:r>
+            <a:r>
+              <a:rPr lang="pl-PL" sz="1600" dirty="0" err="1" smtClean="0">
+                <a:latin typeface="Bahnschrift Light" pitchFamily="34" charset="0"/>
+              </a:rPr>
+              <a:t>ready-to-go</a:t>
+            </a:r>
+            <a:r>
+              <a:rPr lang="pl-PL" sz="1600" dirty="0" smtClean="0">
+                <a:latin typeface="Bahnschrift Light" pitchFamily="34" charset="0"/>
+              </a:rPr>
+              <a:t> </a:t>
+            </a:r>
+            <a:r>
+              <a:rPr lang="pl-PL" sz="1600" dirty="0" err="1" smtClean="0">
+                <a:latin typeface="Bahnschrift Light" pitchFamily="34" charset="0"/>
+              </a:rPr>
+              <a:t>code</a:t>
+            </a:r>
+            <a:r>
+              <a:rPr lang="pl-PL" sz="1600" dirty="0" smtClean="0">
+                <a:latin typeface="Bahnschrift Light" pitchFamily="34" charset="0"/>
+              </a:rPr>
+              <a:t> </a:t>
+            </a:r>
+            <a:r>
+              <a:rPr lang="pl-PL" sz="1600" dirty="0" smtClean="0">
+                <a:latin typeface="Bahnschrift Light" pitchFamily="34" charset="0"/>
+              </a:rPr>
+              <a:t>	</a:t>
+            </a:r>
+            <a:r>
+              <a:rPr lang="pl-PL" sz="1600" dirty="0" err="1" smtClean="0">
+                <a:latin typeface="Bahnschrift Light" pitchFamily="34" charset="0"/>
+              </a:rPr>
+              <a:t>examples</a:t>
+            </a:r>
+            <a:r>
+              <a:rPr lang="pl-PL" sz="1600" dirty="0" smtClean="0">
+                <a:latin typeface="Bahnschrift Light" pitchFamily="34" charset="0"/>
+              </a:rPr>
+              <a:t> </a:t>
+            </a:r>
+            <a:r>
+              <a:rPr lang="pl-PL" sz="1600" dirty="0" smtClean="0">
+                <a:latin typeface="Bahnschrift Light" pitchFamily="34" charset="0"/>
+              </a:rPr>
+              <a:t>and </a:t>
+            </a:r>
+            <a:r>
+              <a:rPr lang="pl-PL" sz="1600" dirty="0" err="1" smtClean="0">
+                <a:latin typeface="Bahnschrift Light" pitchFamily="34" charset="0"/>
+              </a:rPr>
+              <a:t>our</a:t>
+            </a:r>
+            <a:r>
+              <a:rPr lang="pl-PL" sz="1600" dirty="0" smtClean="0">
+                <a:latin typeface="Bahnschrift Light" pitchFamily="34" charset="0"/>
+              </a:rPr>
+              <a:t> </a:t>
+            </a:r>
+            <a:r>
+              <a:rPr lang="pl-PL" sz="1600" dirty="0" err="1" smtClean="0">
+                <a:latin typeface="Bahnschrift Light" pitchFamily="34" charset="0"/>
+              </a:rPr>
+              <a:t>summaries</a:t>
+            </a:r>
+            <a:r>
+              <a:rPr lang="pl-PL" sz="1600" dirty="0" smtClean="0">
+                <a:latin typeface="Bahnschrift Light" pitchFamily="34" charset="0"/>
+              </a:rPr>
+              <a:t> and </a:t>
+            </a:r>
+            <a:r>
+              <a:rPr lang="pl-PL" sz="1600" dirty="0" err="1" smtClean="0">
+                <a:latin typeface="Bahnschrift Light" pitchFamily="34" charset="0"/>
+              </a:rPr>
+              <a:t>findings</a:t>
+            </a:r>
+            <a:endParaRPr lang="pl-PL" sz="1600" dirty="0" smtClean="0">
+              <a:latin typeface="Bahnschrift Light" pitchFamily="34" charset="0"/>
+            </a:endParaRPr>
+          </a:p>
+          <a:p>
+            <a:pPr>
+              <a:buNone/>
+            </a:pPr>
+            <a:endParaRPr lang="pl-PL" sz="1600" dirty="0" smtClean="0">
+              <a:latin typeface="Bahnschrift Light" pitchFamily="34" charset="0"/>
+            </a:endParaRPr>
+          </a:p>
+          <a:p>
+            <a:pPr>
+              <a:buNone/>
+            </a:pPr>
+            <a:endParaRPr lang="pl-PL" sz="1600" dirty="0" smtClean="0">
+              <a:latin typeface="Bahnschrift Light" pitchFamily="34" charset="0"/>
+            </a:endParaRPr>
+          </a:p>
+          <a:p>
+            <a:pPr>
+              <a:buNone/>
+            </a:pPr>
+            <a:endParaRPr lang="pl-PL" sz="1600" dirty="0" smtClean="0">
+              <a:latin typeface="Bahnschrift Light" pitchFamily="34" charset="0"/>
+            </a:endParaRPr>
+          </a:p>
+          <a:p>
+            <a:pPr>
+              <a:buNone/>
+            </a:pPr>
+            <a:endParaRPr lang="pl-PL" sz="1600" dirty="0" smtClean="0">
+              <a:latin typeface="Bahnschrift Light" pitchFamily="34" charset="0"/>
+            </a:endParaRPr>
+          </a:p>
+          <a:p>
+            <a:pPr>
+              <a:buNone/>
+            </a:pPr>
+            <a:endParaRPr lang="pl-PL" sz="1600" dirty="0" smtClean="0">
+              <a:latin typeface="Bahnschrift Light" pitchFamily="34" charset="0"/>
+            </a:endParaRPr>
+          </a:p>
+        </p:txBody>
+      </p:sp>
+    </p:spTree>
+  </p:cSld>
+  <p:clrMapOvr>
+    <a:masterClrMapping/>
+  </p:clrMapOvr>
+</p:sld>
+</file>
+
+<file path=ppt/slides/slide17.xml><?xml version="1.0" encoding="utf-8"?>
 <p:sld xmlns:a="http://schemas.openxmlformats.org/drawingml/2006/main" xmlns:r="http://schemas.openxmlformats.org/officeDocument/2006/relationships" xmlns:p="http://schemas.openxmlformats.org/presentationml/2006/main">
   <p:cSld>
     <p:spTree>
@@ -7193,7 +8440,7 @@
     </p:spTree>
     <p:extLst>
       <p:ext uri="{BB962C8B-B14F-4D97-AF65-F5344CB8AC3E}">
-        <p14:creationId xmlns="" xmlns:p14="http://schemas.microsoft.com/office/powerpoint/2010/main" val="2260457915"/>
+        <p14:creationId xmlns:p14="http://schemas.microsoft.com/office/powerpoint/2010/main" xmlns="" val="2260457915"/>
       </p:ext>
     </p:extLst>
   </p:cSld>
@@ -7290,13 +8537,7 @@
               <a:rPr lang="pl-PL" sz="2000" dirty="0" err="1" smtClean="0">
                 <a:latin typeface="Bahnschrift Light" pitchFamily="34" charset="0"/>
               </a:rPr>
-              <a:t>C</a:t>
-            </a:r>
-            <a:r>
-              <a:rPr lang="pl-PL" sz="2000" dirty="0" err="1" smtClean="0">
-                <a:latin typeface="Bahnschrift Light" pitchFamily="34" charset="0"/>
-              </a:rPr>
-              <a:t>lassic</a:t>
+              <a:t>Classic</a:t>
             </a:r>
             <a:r>
               <a:rPr lang="pl-PL" sz="2000" dirty="0" smtClean="0">
@@ -7471,13 +8712,7 @@
               <a:rPr lang="pl-PL" sz="2000" dirty="0" err="1" smtClean="0">
                 <a:latin typeface="Bahnschrift Light" pitchFamily="34" charset="0"/>
               </a:rPr>
-              <a:t>M</a:t>
-            </a:r>
-            <a:r>
-              <a:rPr lang="pl-PL" sz="2000" dirty="0" err="1" smtClean="0">
-                <a:latin typeface="Bahnschrift Light" pitchFamily="34" charset="0"/>
-              </a:rPr>
-              <a:t>achine</a:t>
+              <a:t>Machine</a:t>
             </a:r>
             <a:r>
               <a:rPr lang="pl-PL" sz="2000" dirty="0" smtClean="0">
@@ -7738,13 +8973,7 @@
               <a:rPr lang="pl-PL" sz="2000" dirty="0" err="1" smtClean="0">
                 <a:latin typeface="Bahnschrift Light" pitchFamily="34" charset="0"/>
               </a:rPr>
-              <a:t>C</a:t>
-            </a:r>
-            <a:r>
-              <a:rPr lang="pl-PL" sz="2000" dirty="0" err="1" smtClean="0">
-                <a:latin typeface="Bahnschrift Light" pitchFamily="34" charset="0"/>
-              </a:rPr>
-              <a:t>lassic</a:t>
+              <a:t>Classic</a:t>
             </a:r>
             <a:r>
               <a:rPr lang="pl-PL" sz="2000" dirty="0" smtClean="0">
@@ -7919,13 +9148,7 @@
               <a:rPr lang="pl-PL" sz="2000" dirty="0" err="1" smtClean="0">
                 <a:latin typeface="Bahnschrift Light" pitchFamily="34" charset="0"/>
               </a:rPr>
-              <a:t>M</a:t>
-            </a:r>
-            <a:r>
-              <a:rPr lang="pl-PL" sz="2000" dirty="0" err="1" smtClean="0">
-                <a:latin typeface="Bahnschrift Light" pitchFamily="34" charset="0"/>
-              </a:rPr>
-              <a:t>achine</a:t>
+              <a:t>Machine</a:t>
             </a:r>
             <a:r>
               <a:rPr lang="pl-PL" sz="2000" dirty="0" smtClean="0">
@@ -8048,13 +9271,7 @@
               <a:rPr lang="pl-PL" sz="1600" dirty="0" err="1" smtClean="0">
                 <a:latin typeface="Bahnschrift Light" pitchFamily="34" charset="0"/>
               </a:rPr>
-              <a:t>i</a:t>
-            </a:r>
-            <a:r>
-              <a:rPr lang="pl-PL" sz="1600" dirty="0" err="1" smtClean="0">
-                <a:latin typeface="Bahnschrift Light" pitchFamily="34" charset="0"/>
-              </a:rPr>
-              <a:t>nitial</a:t>
+              <a:t>initial</a:t>
             </a:r>
             <a:r>
               <a:rPr lang="pl-PL" sz="1600" dirty="0" smtClean="0">
@@ -8082,13 +9299,7 @@
               <a:rPr lang="pl-PL" sz="1600" dirty="0" err="1" smtClean="0">
                 <a:latin typeface="Bahnschrift Light" pitchFamily="34" charset="0"/>
               </a:rPr>
-              <a:t>t</a:t>
-            </a:r>
-            <a:r>
-              <a:rPr lang="pl-PL" sz="1600" dirty="0" err="1" smtClean="0">
-                <a:latin typeface="Bahnschrift Light" pitchFamily="34" charset="0"/>
-              </a:rPr>
-              <a:t>ransient</a:t>
+              <a:t>transient</a:t>
             </a:r>
             <a:r>
               <a:rPr lang="pl-PL" sz="1600" dirty="0" smtClean="0">
@@ -8116,13 +9327,7 @@
               <a:rPr lang="pl-PL" sz="1600" dirty="0" err="1" smtClean="0">
                 <a:latin typeface="Bahnschrift Light" pitchFamily="34" charset="0"/>
               </a:rPr>
-              <a:t>a</a:t>
-            </a:r>
-            <a:r>
-              <a:rPr lang="pl-PL" sz="1600" dirty="0" err="1" smtClean="0">
-                <a:latin typeface="Bahnschrift Light" pitchFamily="34" charset="0"/>
-              </a:rPr>
-              <a:t>nalysis</a:t>
+              <a:t>analysis</a:t>
             </a:r>
             <a:r>
               <a:rPr lang="pl-PL" sz="1600" dirty="0" smtClean="0">
@@ -8356,9 +9561,6 @@
               </a:rPr>
               <a:t>data import </a:t>
             </a:r>
-            <a:endParaRPr lang="pl-PL" sz="2400" dirty="0" smtClean="0">
-              <a:latin typeface="Bahnschrift Light" pitchFamily="34" charset="0"/>
-            </a:endParaRPr>
           </a:p>
           <a:p>
             <a:pPr>
@@ -8571,9 +9773,6 @@
               </a:rPr>
               <a:t>)</a:t>
             </a:r>
-            <a:endParaRPr lang="pl-PL" sz="2400" dirty="0" smtClean="0">
-              <a:latin typeface="Bahnschrift Light" pitchFamily="34" charset="0"/>
-            </a:endParaRPr>
           </a:p>
           <a:p>
             <a:pPr>
@@ -8588,13 +9787,7 @@
               <a:rPr lang="pl-PL" sz="2400" dirty="0" smtClean="0">
                 <a:latin typeface="Bahnschrift Light" pitchFamily="34" charset="0"/>
               </a:rPr>
-              <a:t> </a:t>
-            </a:r>
-            <a:r>
-              <a:rPr lang="pl-PL" sz="2400" dirty="0" smtClean="0">
-                <a:latin typeface="Bahnschrift Light" pitchFamily="34" charset="0"/>
-              </a:rPr>
-              <a:t>data and </a:t>
+              <a:t> data and </a:t>
             </a:r>
             <a:r>
               <a:rPr lang="pl-PL" sz="2400" dirty="0" err="1" smtClean="0">
@@ -8861,13 +10054,7 @@
               <a:rPr lang="pl-PL" sz="2400" dirty="0" smtClean="0">
                 <a:latin typeface="Bahnschrift Light" pitchFamily="34" charset="0"/>
               </a:rPr>
-              <a:t>	</a:t>
-            </a:r>
-            <a:r>
-              <a:rPr lang="pl-PL" sz="2400" dirty="0" smtClean="0">
-                <a:latin typeface="Bahnschrift Light" pitchFamily="34" charset="0"/>
-              </a:rPr>
-              <a:t>- but </a:t>
+              <a:t>	- but </a:t>
             </a:r>
             <a:r>
               <a:rPr lang="pl-PL" sz="2400" dirty="0" err="1" smtClean="0">
@@ -8899,13 +10086,7 @@
               <a:rPr lang="pl-PL" sz="2400" dirty="0" smtClean="0">
                 <a:latin typeface="Bahnschrift Light" pitchFamily="34" charset="0"/>
               </a:rPr>
-              <a:t>	</a:t>
-            </a:r>
-            <a:r>
-              <a:rPr lang="pl-PL" sz="2400" dirty="0" smtClean="0">
-                <a:latin typeface="Bahnschrift Light" pitchFamily="34" charset="0"/>
-              </a:rPr>
-              <a:t>- </a:t>
+              <a:t>	- </a:t>
             </a:r>
             <a:r>
               <a:rPr lang="pl-PL" sz="2400" dirty="0" err="1" smtClean="0">
@@ -8952,13 +10133,7 @@
               <a:rPr lang="pl-PL" sz="2400" dirty="0" smtClean="0">
                 <a:latin typeface="Bahnschrift Light" pitchFamily="34" charset="0"/>
               </a:rPr>
-              <a:t>	</a:t>
-            </a:r>
-            <a:r>
-              <a:rPr lang="pl-PL" sz="2400" dirty="0" smtClean="0">
-                <a:latin typeface="Bahnschrift Light" pitchFamily="34" charset="0"/>
-              </a:rPr>
-              <a:t>- </a:t>
+              <a:t>	- </a:t>
             </a:r>
             <a:r>
               <a:rPr lang="pl-PL" sz="2400" dirty="0" err="1" smtClean="0">
@@ -9056,13 +10231,7 @@
               <a:rPr lang="pl-PL" sz="2400" dirty="0" smtClean="0">
                 <a:latin typeface="Bahnschrift Light" pitchFamily="34" charset="0"/>
               </a:rPr>
-              <a:t>	</a:t>
-            </a:r>
-            <a:r>
-              <a:rPr lang="pl-PL" sz="2400" dirty="0" smtClean="0">
-                <a:latin typeface="Bahnschrift Light" pitchFamily="34" charset="0"/>
-              </a:rPr>
-              <a:t>- </a:t>
+              <a:t>	- </a:t>
             </a:r>
             <a:r>
               <a:rPr lang="pl-PL" sz="2400" dirty="0" err="1" smtClean="0">
@@ -9109,13 +10278,7 @@
               <a:rPr lang="pl-PL" sz="2400" dirty="0" smtClean="0">
                 <a:latin typeface="Bahnschrift Light" pitchFamily="34" charset="0"/>
               </a:rPr>
-              <a:t>	</a:t>
-            </a:r>
-            <a:r>
-              <a:rPr lang="pl-PL" sz="2400" dirty="0" smtClean="0">
-                <a:latin typeface="Bahnschrift Light" pitchFamily="34" charset="0"/>
-              </a:rPr>
-              <a:t>- </a:t>
+              <a:t>	- </a:t>
             </a:r>
             <a:r>
               <a:rPr lang="pl-PL" sz="2400" dirty="0" err="1" smtClean="0">
@@ -9186,13 +10349,7 @@
               <a:rPr lang="pl-PL" sz="2400" dirty="0" smtClean="0">
                 <a:latin typeface="Bahnschrift Light" pitchFamily="34" charset="0"/>
               </a:rPr>
-              <a:t>	</a:t>
-            </a:r>
-            <a:r>
-              <a:rPr lang="pl-PL" sz="2400" dirty="0" smtClean="0">
-                <a:latin typeface="Bahnschrift Light" pitchFamily="34" charset="0"/>
-              </a:rPr>
-              <a:t>- </a:t>
+              <a:t>	- </a:t>
             </a:r>
             <a:r>
               <a:rPr lang="pl-PL" sz="2400" dirty="0" err="1" smtClean="0">
@@ -9266,9 +10423,6 @@
               </a:rPr>
               <a:t> </a:t>
             </a:r>
-            <a:endParaRPr lang="pl-PL" sz="2400" dirty="0" smtClean="0">
-              <a:latin typeface="Bahnschrift Light" pitchFamily="34" charset="0"/>
-            </a:endParaRPr>
           </a:p>
           <a:p>
             <a:pPr>
@@ -9410,9 +10564,6 @@
               </a:rPr>
               <a:t>data import </a:t>
             </a:r>
-            <a:endParaRPr lang="pl-PL" sz="2400" dirty="0" smtClean="0">
-              <a:latin typeface="Bahnschrift Light" pitchFamily="34" charset="0"/>
-            </a:endParaRPr>
           </a:p>
           <a:p>
             <a:pPr>
@@ -9613,9 +10764,6 @@
               </a:rPr>
               <a:t>)</a:t>
             </a:r>
-            <a:endParaRPr lang="pl-PL" sz="2400" dirty="0" smtClean="0">
-              <a:latin typeface="Bahnschrift Light" pitchFamily="34" charset="0"/>
-            </a:endParaRPr>
           </a:p>
           <a:p>
             <a:pPr>
@@ -9630,13 +10778,7 @@
               <a:rPr lang="pl-PL" sz="2400" dirty="0" smtClean="0">
                 <a:latin typeface="Bahnschrift Light" pitchFamily="34" charset="0"/>
               </a:rPr>
-              <a:t> </a:t>
-            </a:r>
-            <a:r>
-              <a:rPr lang="pl-PL" sz="2400" dirty="0" smtClean="0">
-                <a:latin typeface="Bahnschrift Light" pitchFamily="34" charset="0"/>
-              </a:rPr>
-              <a:t>data and </a:t>
+              <a:t> data and </a:t>
             </a:r>
             <a:r>
               <a:rPr lang="pl-PL" sz="2400" dirty="0" err="1" smtClean="0">
@@ -9926,13 +11068,7 @@
               <a:rPr lang="pl-PL" sz="2400" dirty="0" smtClean="0">
                 <a:latin typeface="Bahnschrift Light" pitchFamily="34" charset="0"/>
               </a:rPr>
-              <a:t>	</a:t>
-            </a:r>
-            <a:r>
-              <a:rPr lang="pl-PL" sz="2400" dirty="0" smtClean="0">
-                <a:latin typeface="Bahnschrift Light" pitchFamily="34" charset="0"/>
-              </a:rPr>
-              <a:t>- BRMS model </a:t>
+              <a:t>	- BRMS model </a:t>
             </a:r>
             <a:r>
               <a:rPr lang="pl-PL" sz="2400" dirty="0" err="1" smtClean="0">
@@ -10015,13 +11151,7 @@
               <a:rPr lang="pl-PL" sz="2400" dirty="0" smtClean="0">
                 <a:latin typeface="Bahnschrift Light" pitchFamily="34" charset="0"/>
               </a:rPr>
-              <a:t>	</a:t>
-            </a:r>
-            <a:r>
-              <a:rPr lang="pl-PL" sz="2400" dirty="0" smtClean="0">
-                <a:latin typeface="Bahnschrift Light" pitchFamily="34" charset="0"/>
-              </a:rPr>
-              <a:t>- but </a:t>
+              <a:t>	- but </a:t>
             </a:r>
             <a:r>
               <a:rPr lang="pl-PL" sz="2400" dirty="0" err="1" smtClean="0">
@@ -10273,13 +11403,7 @@
               <a:rPr lang="pl-PL" sz="2400" dirty="0" smtClean="0">
                 <a:latin typeface="Bahnschrift Light" pitchFamily="34" charset="0"/>
               </a:rPr>
-              <a:t>data </a:t>
-            </a:r>
-            <a:r>
-              <a:rPr lang="pl-PL" sz="2400" dirty="0" smtClean="0">
-                <a:latin typeface="Bahnschrift Light" pitchFamily="34" charset="0"/>
-              </a:rPr>
-              <a:t>import (file format </a:t>
+              <a:t>data import (file format </a:t>
             </a:r>
             <a:r>
               <a:rPr lang="pl-PL" sz="2400" dirty="0" err="1" smtClean="0">
@@ -10338,25 +11462,13 @@
               <a:rPr lang="pl-PL" sz="2400" dirty="0" err="1" smtClean="0">
                 <a:latin typeface="Bahnschrift Light" pitchFamily="34" charset="0"/>
               </a:rPr>
-              <a:t>p</a:t>
-            </a:r>
-            <a:r>
-              <a:rPr lang="pl-PL" sz="2400" dirty="0" err="1" smtClean="0">
-                <a:latin typeface="Bahnschrift Light" pitchFamily="34" charset="0"/>
-              </a:rPr>
-              <a:t>reprocessing</a:t>
-            </a:r>
-            <a:r>
-              <a:rPr lang="pl-PL" sz="2400" dirty="0" smtClean="0">
-                <a:latin typeface="Bahnschrift Light" pitchFamily="34" charset="0"/>
-              </a:rPr>
-              <a:t> </a:t>
-            </a:r>
-            <a:r>
-              <a:rPr lang="pl-PL" sz="2400" dirty="0" smtClean="0">
-                <a:latin typeface="Bahnschrift Light" pitchFamily="34" charset="0"/>
-              </a:rPr>
-              <a:t>(</a:t>
+              <a:t>preprocessing</a:t>
+            </a:r>
+            <a:r>
+              <a:rPr lang="pl-PL" sz="2400" dirty="0" smtClean="0">
+                <a:latin typeface="Bahnschrift Light" pitchFamily="34" charset="0"/>
+              </a:rPr>
+              <a:t> (</a:t>
             </a:r>
             <a:r>
               <a:rPr lang="pl-PL" sz="2400" dirty="0" err="1" smtClean="0">
@@ -10420,13 +11532,7 @@
               <a:rPr lang="pl-PL" sz="2400" dirty="0" smtClean="0">
                 <a:latin typeface="Bahnschrift Light" pitchFamily="34" charset="0"/>
               </a:rPr>
-              <a:t>ICA </a:t>
-            </a:r>
-            <a:r>
-              <a:rPr lang="pl-PL" sz="2400" dirty="0" smtClean="0">
-                <a:latin typeface="Bahnschrift Light" pitchFamily="34" charset="0"/>
-              </a:rPr>
-              <a:t>/PCA and </a:t>
+              <a:t>ICA /PCA and </a:t>
             </a:r>
             <a:r>
               <a:rPr lang="pl-PL" sz="2400" dirty="0" err="1" smtClean="0">
@@ -10883,13 +11989,7 @@
               <a:rPr lang="pl-PL" sz="2800" dirty="0" smtClean="0">
                 <a:latin typeface="Bahnschrift Light" pitchFamily="34" charset="0"/>
               </a:rPr>
-              <a:t>	</a:t>
-            </a:r>
-            <a:r>
-              <a:rPr lang="pl-PL" sz="2800" dirty="0" smtClean="0">
-                <a:latin typeface="Bahnschrift Light" pitchFamily="34" charset="0"/>
-              </a:rPr>
-              <a:t>	</a:t>
+              <a:t>		</a:t>
             </a:r>
             <a:r>
               <a:rPr lang="pl-PL" sz="2000" dirty="0" err="1" smtClean="0">
@@ -10984,13 +12084,7 @@
               <a:rPr lang="pl-PL" sz="2000" dirty="0" smtClean="0">
                 <a:latin typeface="Bahnschrift Light" pitchFamily="34" charset="0"/>
               </a:rPr>
-              <a:t>	</a:t>
-            </a:r>
-            <a:r>
-              <a:rPr lang="pl-PL" sz="2000" dirty="0" smtClean="0">
-                <a:latin typeface="Bahnschrift Light" pitchFamily="34" charset="0"/>
-              </a:rPr>
-              <a:t>	</a:t>
+              <a:t>		</a:t>
             </a:r>
             <a:r>
               <a:rPr lang="pl-PL" sz="2000" dirty="0" err="1" smtClean="0">
@@ -11242,17 +12336,8 @@
               <a:rPr lang="pl-PL" sz="2800" dirty="0" smtClean="0">
                 <a:latin typeface="Bahnschrift Light" pitchFamily="34" charset="0"/>
               </a:rPr>
-              <a:t>	</a:t>
-            </a:r>
-            <a:r>
-              <a:rPr lang="pl-PL" sz="2800" dirty="0" smtClean="0">
-                <a:latin typeface="Bahnschrift Light" pitchFamily="34" charset="0"/>
-              </a:rPr>
-              <a:t>	</a:t>
-            </a:r>
-            <a:endParaRPr lang="pl-PL" sz="2800" dirty="0" smtClean="0">
-              <a:latin typeface="Bahnschrift Light" pitchFamily="34" charset="0"/>
-            </a:endParaRPr>
+              <a:t>		</a:t>
+            </a:r>
           </a:p>
           <a:p>
             <a:pPr>

</xml_diff>